<commit_message>
all are update as per latest drive and lab data
</commit_message>
<xml_diff>
--- a/Sem-1/RDBMS Theory/Unit-2/Day_10.pptx
+++ b/Sem-1/RDBMS Theory/Unit-2/Day_10.pptx
@@ -5,7 +5,7 @@
     <p:sldMasterId id="2147483648" r:id="rId1"/>
   </p:sldMasterIdLst>
   <p:notesMasterIdLst>
-    <p:notesMasterId r:id="rId22"/>
+    <p:notesMasterId r:id="rId17"/>
   </p:notesMasterIdLst>
   <p:sldIdLst>
     <p:sldId id="256" r:id="rId2"/>
@@ -23,11 +23,6 @@
     <p:sldId id="330" r:id="rId14"/>
     <p:sldId id="271" r:id="rId15"/>
     <p:sldId id="356" r:id="rId16"/>
-    <p:sldId id="362" r:id="rId17"/>
-    <p:sldId id="363" r:id="rId18"/>
-    <p:sldId id="364" r:id="rId19"/>
-    <p:sldId id="365" r:id="rId20"/>
-    <p:sldId id="366" r:id="rId21"/>
   </p:sldIdLst>
   <p:sldSz cx="12192000" cy="6858000"/>
   <p:notesSz cx="6858000" cy="9144000"/>
@@ -216,7 +211,7 @@
           <a:p>
             <a:fld id="{0557CF61-3370-469C-9B19-FF9F826517D8}" type="datetimeFigureOut">
               <a:rPr lang="en-IN" smtClean="0"/>
-              <a:t>10-09-2025</a:t>
+              <a:t>13-09-2025</a:t>
             </a:fld>
             <a:endParaRPr lang="en-IN"/>
           </a:p>
@@ -506,7 +501,7 @@
           <p:cNvPr id="37890" name="Rectangle 7">
             <a:extLst>
               <a:ext uri="{FF2B5EF4-FFF2-40B4-BE49-F238E27FC236}">
-                <a16:creationId xmlns="" xmlns:a16="http://schemas.microsoft.com/office/drawing/2014/main" id="{13AB9974-6EAC-4690-8134-37664E3AC3ED}"/>
+                <a16:creationId xmlns:a16="http://schemas.microsoft.com/office/drawing/2014/main" xmlns="" id="{13AB9974-6EAC-4690-8134-37664E3AC3ED}"/>
               </a:ext>
             </a:extLst>
           </p:cNvPr>
@@ -660,7 +655,7 @@
           <p:cNvPr id="37891" name="Rectangle 2">
             <a:extLst>
               <a:ext uri="{FF2B5EF4-FFF2-40B4-BE49-F238E27FC236}">
-                <a16:creationId xmlns="" xmlns:a16="http://schemas.microsoft.com/office/drawing/2014/main" id="{A111289F-CFAA-4708-ABC0-AB9647050CD2}"/>
+                <a16:creationId xmlns:a16="http://schemas.microsoft.com/office/drawing/2014/main" xmlns="" id="{A111289F-CFAA-4708-ABC0-AB9647050CD2}"/>
               </a:ext>
             </a:extLst>
           </p:cNvPr>
@@ -680,7 +675,7 @@
           <p:cNvPr id="37892" name="Rectangle 3">
             <a:extLst>
               <a:ext uri="{FF2B5EF4-FFF2-40B4-BE49-F238E27FC236}">
-                <a16:creationId xmlns="" xmlns:a16="http://schemas.microsoft.com/office/drawing/2014/main" id="{5813CA20-363B-4D67-B577-BE0D51F187C3}"/>
+                <a16:creationId xmlns:a16="http://schemas.microsoft.com/office/drawing/2014/main" xmlns="" id="{5813CA20-363B-4D67-B577-BE0D51F187C3}"/>
               </a:ext>
             </a:extLst>
           </p:cNvPr>
@@ -760,7 +755,7 @@
           <p:cNvPr id="38914" name="Rectangle 7">
             <a:extLst>
               <a:ext uri="{FF2B5EF4-FFF2-40B4-BE49-F238E27FC236}">
-                <a16:creationId xmlns="" xmlns:a16="http://schemas.microsoft.com/office/drawing/2014/main" id="{9B86BDF5-9241-4945-A460-0798F640E33C}"/>
+                <a16:creationId xmlns:a16="http://schemas.microsoft.com/office/drawing/2014/main" xmlns="" id="{9B86BDF5-9241-4945-A460-0798F640E33C}"/>
               </a:ext>
             </a:extLst>
           </p:cNvPr>
@@ -914,7 +909,7 @@
           <p:cNvPr id="38915" name="Rectangle 2">
             <a:extLst>
               <a:ext uri="{FF2B5EF4-FFF2-40B4-BE49-F238E27FC236}">
-                <a16:creationId xmlns="" xmlns:a16="http://schemas.microsoft.com/office/drawing/2014/main" id="{19BF0E54-3764-42A5-B428-49DFA7931AC2}"/>
+                <a16:creationId xmlns:a16="http://schemas.microsoft.com/office/drawing/2014/main" xmlns="" id="{19BF0E54-3764-42A5-B428-49DFA7931AC2}"/>
               </a:ext>
             </a:extLst>
           </p:cNvPr>
@@ -934,7 +929,7 @@
           <p:cNvPr id="38916" name="Rectangle 3">
             <a:extLst>
               <a:ext uri="{FF2B5EF4-FFF2-40B4-BE49-F238E27FC236}">
-                <a16:creationId xmlns="" xmlns:a16="http://schemas.microsoft.com/office/drawing/2014/main" id="{27B96F88-B8B8-4FD4-B08D-278D9A1623D7}"/>
+                <a16:creationId xmlns:a16="http://schemas.microsoft.com/office/drawing/2014/main" xmlns="" id="{27B96F88-B8B8-4FD4-B08D-278D9A1623D7}"/>
               </a:ext>
             </a:extLst>
           </p:cNvPr>
@@ -1014,7 +1009,7 @@
           <p:cNvPr id="35842" name="Rectangle 7">
             <a:extLst>
               <a:ext uri="{FF2B5EF4-FFF2-40B4-BE49-F238E27FC236}">
-                <a16:creationId xmlns="" xmlns:a16="http://schemas.microsoft.com/office/drawing/2014/main" id="{D9EE659C-B661-488B-BA2B-747225B80E33}"/>
+                <a16:creationId xmlns:a16="http://schemas.microsoft.com/office/drawing/2014/main" xmlns="" id="{D9EE659C-B661-488B-BA2B-747225B80E33}"/>
               </a:ext>
             </a:extLst>
           </p:cNvPr>
@@ -1168,7 +1163,7 @@
           <p:cNvPr id="35843" name="Rectangle 2">
             <a:extLst>
               <a:ext uri="{FF2B5EF4-FFF2-40B4-BE49-F238E27FC236}">
-                <a16:creationId xmlns="" xmlns:a16="http://schemas.microsoft.com/office/drawing/2014/main" id="{DF789BBD-0C4C-40D1-8A3D-28B7FF3F3253}"/>
+                <a16:creationId xmlns:a16="http://schemas.microsoft.com/office/drawing/2014/main" xmlns="" id="{DF789BBD-0C4C-40D1-8A3D-28B7FF3F3253}"/>
               </a:ext>
             </a:extLst>
           </p:cNvPr>
@@ -1188,7 +1183,7 @@
           <p:cNvPr id="35844" name="Rectangle 3">
             <a:extLst>
               <a:ext uri="{FF2B5EF4-FFF2-40B4-BE49-F238E27FC236}">
-                <a16:creationId xmlns="" xmlns:a16="http://schemas.microsoft.com/office/drawing/2014/main" id="{97B5244F-E7C8-4540-9439-DBA106EFBA63}"/>
+                <a16:creationId xmlns:a16="http://schemas.microsoft.com/office/drawing/2014/main" xmlns="" id="{97B5244F-E7C8-4540-9439-DBA106EFBA63}"/>
               </a:ext>
             </a:extLst>
           </p:cNvPr>
@@ -1268,7 +1263,7 @@
           <p:cNvPr id="30722" name="Rectangle 7">
             <a:extLst>
               <a:ext uri="{FF2B5EF4-FFF2-40B4-BE49-F238E27FC236}">
-                <a16:creationId xmlns="" xmlns:a16="http://schemas.microsoft.com/office/drawing/2014/main" id="{7525E0E1-43F9-4900-9BE5-132226FB0E4E}"/>
+                <a16:creationId xmlns:a16="http://schemas.microsoft.com/office/drawing/2014/main" xmlns="" id="{7525E0E1-43F9-4900-9BE5-132226FB0E4E}"/>
               </a:ext>
             </a:extLst>
           </p:cNvPr>
@@ -1422,7 +1417,7 @@
           <p:cNvPr id="30723" name="Rectangle 2">
             <a:extLst>
               <a:ext uri="{FF2B5EF4-FFF2-40B4-BE49-F238E27FC236}">
-                <a16:creationId xmlns="" xmlns:a16="http://schemas.microsoft.com/office/drawing/2014/main" id="{C20427AF-6E32-4CBD-B356-C2F6CD96790C}"/>
+                <a16:creationId xmlns:a16="http://schemas.microsoft.com/office/drawing/2014/main" xmlns="" id="{C20427AF-6E32-4CBD-B356-C2F6CD96790C}"/>
               </a:ext>
             </a:extLst>
           </p:cNvPr>
@@ -1442,7 +1437,7 @@
           <p:cNvPr id="30724" name="Rectangle 3">
             <a:extLst>
               <a:ext uri="{FF2B5EF4-FFF2-40B4-BE49-F238E27FC236}">
-                <a16:creationId xmlns="" xmlns:a16="http://schemas.microsoft.com/office/drawing/2014/main" id="{4BAC681C-C0E8-4EAD-98E3-DFA598A23061}"/>
+                <a16:creationId xmlns:a16="http://schemas.microsoft.com/office/drawing/2014/main" xmlns="" id="{4BAC681C-C0E8-4EAD-98E3-DFA598A23061}"/>
               </a:ext>
             </a:extLst>
           </p:cNvPr>
@@ -1522,7 +1517,7 @@
           <p:cNvPr id="40962" name="Rectangle 7">
             <a:extLst>
               <a:ext uri="{FF2B5EF4-FFF2-40B4-BE49-F238E27FC236}">
-                <a16:creationId xmlns="" xmlns:a16="http://schemas.microsoft.com/office/drawing/2014/main" id="{BA4B175A-80BC-45C3-8D4F-3FDB4D0F3BC1}"/>
+                <a16:creationId xmlns:a16="http://schemas.microsoft.com/office/drawing/2014/main" xmlns="" id="{BA4B175A-80BC-45C3-8D4F-3FDB4D0F3BC1}"/>
               </a:ext>
             </a:extLst>
           </p:cNvPr>
@@ -1676,7 +1671,7 @@
           <p:cNvPr id="40963" name="Rectangle 2">
             <a:extLst>
               <a:ext uri="{FF2B5EF4-FFF2-40B4-BE49-F238E27FC236}">
-                <a16:creationId xmlns="" xmlns:a16="http://schemas.microsoft.com/office/drawing/2014/main" id="{5B51E98E-EAC5-4337-A2DE-8575B16F13B7}"/>
+                <a16:creationId xmlns:a16="http://schemas.microsoft.com/office/drawing/2014/main" xmlns="" id="{5B51E98E-EAC5-4337-A2DE-8575B16F13B7}"/>
               </a:ext>
             </a:extLst>
           </p:cNvPr>
@@ -1696,7 +1691,7 @@
           <p:cNvPr id="40964" name="Rectangle 3">
             <a:extLst>
               <a:ext uri="{FF2B5EF4-FFF2-40B4-BE49-F238E27FC236}">
-                <a16:creationId xmlns="" xmlns:a16="http://schemas.microsoft.com/office/drawing/2014/main" id="{14F79FA4-ACC3-4063-9953-2213E67BDA95}"/>
+                <a16:creationId xmlns:a16="http://schemas.microsoft.com/office/drawing/2014/main" xmlns="" id="{14F79FA4-ACC3-4063-9953-2213E67BDA95}"/>
               </a:ext>
             </a:extLst>
           </p:cNvPr>
@@ -1776,7 +1771,7 @@
           <p:cNvPr id="2" name="Title 1">
             <a:extLst>
               <a:ext uri="{FF2B5EF4-FFF2-40B4-BE49-F238E27FC236}">
-                <a16:creationId xmlns="" xmlns:a16="http://schemas.microsoft.com/office/drawing/2014/main" id="{7A9B6B20-4424-4F42-ACF6-E4BC66C52A7E}"/>
+                <a16:creationId xmlns:a16="http://schemas.microsoft.com/office/drawing/2014/main" xmlns="" id="{7A9B6B20-4424-4F42-ACF6-E4BC66C52A7E}"/>
               </a:ext>
             </a:extLst>
           </p:cNvPr>
@@ -1814,7 +1809,7 @@
           <p:cNvPr id="3" name="Subtitle 2">
             <a:extLst>
               <a:ext uri="{FF2B5EF4-FFF2-40B4-BE49-F238E27FC236}">
-                <a16:creationId xmlns="" xmlns:a16="http://schemas.microsoft.com/office/drawing/2014/main" id="{96CE4D39-50CC-42CD-927E-A8DB5ACBE078}"/>
+                <a16:creationId xmlns:a16="http://schemas.microsoft.com/office/drawing/2014/main" xmlns="" id="{96CE4D39-50CC-42CD-927E-A8DB5ACBE078}"/>
               </a:ext>
             </a:extLst>
           </p:cNvPr>
@@ -1885,7 +1880,7 @@
           <p:cNvPr id="4" name="Date Placeholder 3">
             <a:extLst>
               <a:ext uri="{FF2B5EF4-FFF2-40B4-BE49-F238E27FC236}">
-                <a16:creationId xmlns="" xmlns:a16="http://schemas.microsoft.com/office/drawing/2014/main" id="{6F2F56B4-4E1A-4CCE-A506-2837EFE9DDDF}"/>
+                <a16:creationId xmlns:a16="http://schemas.microsoft.com/office/drawing/2014/main" xmlns="" id="{6F2F56B4-4E1A-4CCE-A506-2837EFE9DDDF}"/>
               </a:ext>
             </a:extLst>
           </p:cNvPr>
@@ -1903,7 +1898,7 @@
           <a:p>
             <a:fld id="{AE2B94A4-0FC4-42EF-8549-9C116B4DC30A}" type="datetimeFigureOut">
               <a:rPr lang="en-IN" smtClean="0"/>
-              <a:t>10-09-2025</a:t>
+              <a:t>13-09-2025</a:t>
             </a:fld>
             <a:endParaRPr lang="en-IN"/>
           </a:p>
@@ -1914,7 +1909,7 @@
           <p:cNvPr id="5" name="Footer Placeholder 4">
             <a:extLst>
               <a:ext uri="{FF2B5EF4-FFF2-40B4-BE49-F238E27FC236}">
-                <a16:creationId xmlns="" xmlns:a16="http://schemas.microsoft.com/office/drawing/2014/main" id="{806A78F9-25CD-4BAF-928F-BEC1ADCEFB67}"/>
+                <a16:creationId xmlns:a16="http://schemas.microsoft.com/office/drawing/2014/main" xmlns="" id="{806A78F9-25CD-4BAF-928F-BEC1ADCEFB67}"/>
               </a:ext>
             </a:extLst>
           </p:cNvPr>
@@ -1939,7 +1934,7 @@
           <p:cNvPr id="6" name="Slide Number Placeholder 5">
             <a:extLst>
               <a:ext uri="{FF2B5EF4-FFF2-40B4-BE49-F238E27FC236}">
-                <a16:creationId xmlns="" xmlns:a16="http://schemas.microsoft.com/office/drawing/2014/main" id="{250D1360-015E-491B-A829-B1315777AE6C}"/>
+                <a16:creationId xmlns:a16="http://schemas.microsoft.com/office/drawing/2014/main" xmlns="" id="{250D1360-015E-491B-A829-B1315777AE6C}"/>
               </a:ext>
             </a:extLst>
           </p:cNvPr>
@@ -1998,7 +1993,7 @@
           <p:cNvPr id="2" name="Title 1">
             <a:extLst>
               <a:ext uri="{FF2B5EF4-FFF2-40B4-BE49-F238E27FC236}">
-                <a16:creationId xmlns="" xmlns:a16="http://schemas.microsoft.com/office/drawing/2014/main" id="{4DF1A4E2-4B69-4716-AADA-5F32BAF67A89}"/>
+                <a16:creationId xmlns:a16="http://schemas.microsoft.com/office/drawing/2014/main" xmlns="" id="{4DF1A4E2-4B69-4716-AADA-5F32BAF67A89}"/>
               </a:ext>
             </a:extLst>
           </p:cNvPr>
@@ -2027,7 +2022,7 @@
           <p:cNvPr id="3" name="Vertical Text Placeholder 2">
             <a:extLst>
               <a:ext uri="{FF2B5EF4-FFF2-40B4-BE49-F238E27FC236}">
-                <a16:creationId xmlns="" xmlns:a16="http://schemas.microsoft.com/office/drawing/2014/main" id="{51862E6E-A7F6-4132-8FEB-88F7B9403B5F}"/>
+                <a16:creationId xmlns:a16="http://schemas.microsoft.com/office/drawing/2014/main" xmlns="" id="{51862E6E-A7F6-4132-8FEB-88F7B9403B5F}"/>
               </a:ext>
             </a:extLst>
           </p:cNvPr>
@@ -2085,7 +2080,7 @@
           <p:cNvPr id="4" name="Date Placeholder 3">
             <a:extLst>
               <a:ext uri="{FF2B5EF4-FFF2-40B4-BE49-F238E27FC236}">
-                <a16:creationId xmlns="" xmlns:a16="http://schemas.microsoft.com/office/drawing/2014/main" id="{20F2D68B-79A8-450E-9C33-7E30A9F4CEAD}"/>
+                <a16:creationId xmlns:a16="http://schemas.microsoft.com/office/drawing/2014/main" xmlns="" id="{20F2D68B-79A8-450E-9C33-7E30A9F4CEAD}"/>
               </a:ext>
             </a:extLst>
           </p:cNvPr>
@@ -2103,7 +2098,7 @@
           <a:p>
             <a:fld id="{AE2B94A4-0FC4-42EF-8549-9C116B4DC30A}" type="datetimeFigureOut">
               <a:rPr lang="en-IN" smtClean="0"/>
-              <a:t>10-09-2025</a:t>
+              <a:t>13-09-2025</a:t>
             </a:fld>
             <a:endParaRPr lang="en-IN"/>
           </a:p>
@@ -2114,7 +2109,7 @@
           <p:cNvPr id="5" name="Footer Placeholder 4">
             <a:extLst>
               <a:ext uri="{FF2B5EF4-FFF2-40B4-BE49-F238E27FC236}">
-                <a16:creationId xmlns="" xmlns:a16="http://schemas.microsoft.com/office/drawing/2014/main" id="{19C73A5F-BF6D-4593-BBC4-18279113BD41}"/>
+                <a16:creationId xmlns:a16="http://schemas.microsoft.com/office/drawing/2014/main" xmlns="" id="{19C73A5F-BF6D-4593-BBC4-18279113BD41}"/>
               </a:ext>
             </a:extLst>
           </p:cNvPr>
@@ -2139,7 +2134,7 @@
           <p:cNvPr id="6" name="Slide Number Placeholder 5">
             <a:extLst>
               <a:ext uri="{FF2B5EF4-FFF2-40B4-BE49-F238E27FC236}">
-                <a16:creationId xmlns="" xmlns:a16="http://schemas.microsoft.com/office/drawing/2014/main" id="{A472F4AE-07F4-42E4-9673-4AC480D3034B}"/>
+                <a16:creationId xmlns:a16="http://schemas.microsoft.com/office/drawing/2014/main" xmlns="" id="{A472F4AE-07F4-42E4-9673-4AC480D3034B}"/>
               </a:ext>
             </a:extLst>
           </p:cNvPr>
@@ -2198,7 +2193,7 @@
           <p:cNvPr id="2" name="Vertical Title 1">
             <a:extLst>
               <a:ext uri="{FF2B5EF4-FFF2-40B4-BE49-F238E27FC236}">
-                <a16:creationId xmlns="" xmlns:a16="http://schemas.microsoft.com/office/drawing/2014/main" id="{3E18952E-3F82-4013-99F4-527B49FAA8E2}"/>
+                <a16:creationId xmlns:a16="http://schemas.microsoft.com/office/drawing/2014/main" xmlns="" id="{3E18952E-3F82-4013-99F4-527B49FAA8E2}"/>
               </a:ext>
             </a:extLst>
           </p:cNvPr>
@@ -2232,7 +2227,7 @@
           <p:cNvPr id="3" name="Vertical Text Placeholder 2">
             <a:extLst>
               <a:ext uri="{FF2B5EF4-FFF2-40B4-BE49-F238E27FC236}">
-                <a16:creationId xmlns="" xmlns:a16="http://schemas.microsoft.com/office/drawing/2014/main" id="{E95BDB18-62F2-433E-883C-9241CC4D4EA8}"/>
+                <a16:creationId xmlns:a16="http://schemas.microsoft.com/office/drawing/2014/main" xmlns="" id="{E95BDB18-62F2-433E-883C-9241CC4D4EA8}"/>
               </a:ext>
             </a:extLst>
           </p:cNvPr>
@@ -2295,7 +2290,7 @@
           <p:cNvPr id="4" name="Date Placeholder 3">
             <a:extLst>
               <a:ext uri="{FF2B5EF4-FFF2-40B4-BE49-F238E27FC236}">
-                <a16:creationId xmlns="" xmlns:a16="http://schemas.microsoft.com/office/drawing/2014/main" id="{96126847-1F69-44EB-9D1B-F6A4C774205C}"/>
+                <a16:creationId xmlns:a16="http://schemas.microsoft.com/office/drawing/2014/main" xmlns="" id="{96126847-1F69-44EB-9D1B-F6A4C774205C}"/>
               </a:ext>
             </a:extLst>
           </p:cNvPr>
@@ -2313,7 +2308,7 @@
           <a:p>
             <a:fld id="{AE2B94A4-0FC4-42EF-8549-9C116B4DC30A}" type="datetimeFigureOut">
               <a:rPr lang="en-IN" smtClean="0"/>
-              <a:t>10-09-2025</a:t>
+              <a:t>13-09-2025</a:t>
             </a:fld>
             <a:endParaRPr lang="en-IN"/>
           </a:p>
@@ -2324,7 +2319,7 @@
           <p:cNvPr id="5" name="Footer Placeholder 4">
             <a:extLst>
               <a:ext uri="{FF2B5EF4-FFF2-40B4-BE49-F238E27FC236}">
-                <a16:creationId xmlns="" xmlns:a16="http://schemas.microsoft.com/office/drawing/2014/main" id="{6694FF8B-BA1F-47C5-943D-7ABBE20274C2}"/>
+                <a16:creationId xmlns:a16="http://schemas.microsoft.com/office/drawing/2014/main" xmlns="" id="{6694FF8B-BA1F-47C5-943D-7ABBE20274C2}"/>
               </a:ext>
             </a:extLst>
           </p:cNvPr>
@@ -2349,7 +2344,7 @@
           <p:cNvPr id="6" name="Slide Number Placeholder 5">
             <a:extLst>
               <a:ext uri="{FF2B5EF4-FFF2-40B4-BE49-F238E27FC236}">
-                <a16:creationId xmlns="" xmlns:a16="http://schemas.microsoft.com/office/drawing/2014/main" id="{89782271-8BFA-4E09-BE4C-89A8CC6186AA}"/>
+                <a16:creationId xmlns:a16="http://schemas.microsoft.com/office/drawing/2014/main" xmlns="" id="{89782271-8BFA-4E09-BE4C-89A8CC6186AA}"/>
               </a:ext>
             </a:extLst>
           </p:cNvPr>
@@ -2408,7 +2403,7 @@
           <p:cNvPr id="2" name="Title 1">
             <a:extLst>
               <a:ext uri="{FF2B5EF4-FFF2-40B4-BE49-F238E27FC236}">
-                <a16:creationId xmlns="" xmlns:a16="http://schemas.microsoft.com/office/drawing/2014/main" id="{91DB85DB-D2D9-45A2-941A-434AB05ECD27}"/>
+                <a16:creationId xmlns:a16="http://schemas.microsoft.com/office/drawing/2014/main" xmlns="" id="{91DB85DB-D2D9-45A2-941A-434AB05ECD27}"/>
               </a:ext>
             </a:extLst>
           </p:cNvPr>
@@ -2437,7 +2432,7 @@
           <p:cNvPr id="3" name="Content Placeholder 2">
             <a:extLst>
               <a:ext uri="{FF2B5EF4-FFF2-40B4-BE49-F238E27FC236}">
-                <a16:creationId xmlns="" xmlns:a16="http://schemas.microsoft.com/office/drawing/2014/main" id="{EB6B2651-F72D-4883-A5DE-205B0EF5761B}"/>
+                <a16:creationId xmlns:a16="http://schemas.microsoft.com/office/drawing/2014/main" xmlns="" id="{EB6B2651-F72D-4883-A5DE-205B0EF5761B}"/>
               </a:ext>
             </a:extLst>
           </p:cNvPr>
@@ -2495,7 +2490,7 @@
           <p:cNvPr id="4" name="Date Placeholder 3">
             <a:extLst>
               <a:ext uri="{FF2B5EF4-FFF2-40B4-BE49-F238E27FC236}">
-                <a16:creationId xmlns="" xmlns:a16="http://schemas.microsoft.com/office/drawing/2014/main" id="{55D4DEDA-6FE2-4F83-B9B8-E94ADE54482E}"/>
+                <a16:creationId xmlns:a16="http://schemas.microsoft.com/office/drawing/2014/main" xmlns="" id="{55D4DEDA-6FE2-4F83-B9B8-E94ADE54482E}"/>
               </a:ext>
             </a:extLst>
           </p:cNvPr>
@@ -2513,7 +2508,7 @@
           <a:p>
             <a:fld id="{AE2B94A4-0FC4-42EF-8549-9C116B4DC30A}" type="datetimeFigureOut">
               <a:rPr lang="en-IN" smtClean="0"/>
-              <a:t>10-09-2025</a:t>
+              <a:t>13-09-2025</a:t>
             </a:fld>
             <a:endParaRPr lang="en-IN"/>
           </a:p>
@@ -2524,7 +2519,7 @@
           <p:cNvPr id="5" name="Footer Placeholder 4">
             <a:extLst>
               <a:ext uri="{FF2B5EF4-FFF2-40B4-BE49-F238E27FC236}">
-                <a16:creationId xmlns="" xmlns:a16="http://schemas.microsoft.com/office/drawing/2014/main" id="{9E86F614-9171-45DA-89FB-C17E085AD6B3}"/>
+                <a16:creationId xmlns:a16="http://schemas.microsoft.com/office/drawing/2014/main" xmlns="" id="{9E86F614-9171-45DA-89FB-C17E085AD6B3}"/>
               </a:ext>
             </a:extLst>
           </p:cNvPr>
@@ -2549,7 +2544,7 @@
           <p:cNvPr id="6" name="Slide Number Placeholder 5">
             <a:extLst>
               <a:ext uri="{FF2B5EF4-FFF2-40B4-BE49-F238E27FC236}">
-                <a16:creationId xmlns="" xmlns:a16="http://schemas.microsoft.com/office/drawing/2014/main" id="{23BF62AA-9519-4E7B-BD37-34208EAE7059}"/>
+                <a16:creationId xmlns:a16="http://schemas.microsoft.com/office/drawing/2014/main" xmlns="" id="{23BF62AA-9519-4E7B-BD37-34208EAE7059}"/>
               </a:ext>
             </a:extLst>
           </p:cNvPr>
@@ -2608,7 +2603,7 @@
           <p:cNvPr id="2" name="Title 1">
             <a:extLst>
               <a:ext uri="{FF2B5EF4-FFF2-40B4-BE49-F238E27FC236}">
-                <a16:creationId xmlns="" xmlns:a16="http://schemas.microsoft.com/office/drawing/2014/main" id="{791DC6FB-0F8D-4B4B-977D-13253AE3B867}"/>
+                <a16:creationId xmlns:a16="http://schemas.microsoft.com/office/drawing/2014/main" xmlns="" id="{791DC6FB-0F8D-4B4B-977D-13253AE3B867}"/>
               </a:ext>
             </a:extLst>
           </p:cNvPr>
@@ -2646,7 +2641,7 @@
           <p:cNvPr id="3" name="Text Placeholder 2">
             <a:extLst>
               <a:ext uri="{FF2B5EF4-FFF2-40B4-BE49-F238E27FC236}">
-                <a16:creationId xmlns="" xmlns:a16="http://schemas.microsoft.com/office/drawing/2014/main" id="{E8049109-497E-45F4-848B-CD96599B7824}"/>
+                <a16:creationId xmlns:a16="http://schemas.microsoft.com/office/drawing/2014/main" xmlns="" id="{E8049109-497E-45F4-848B-CD96599B7824}"/>
               </a:ext>
             </a:extLst>
           </p:cNvPr>
@@ -2771,7 +2766,7 @@
           <p:cNvPr id="4" name="Date Placeholder 3">
             <a:extLst>
               <a:ext uri="{FF2B5EF4-FFF2-40B4-BE49-F238E27FC236}">
-                <a16:creationId xmlns="" xmlns:a16="http://schemas.microsoft.com/office/drawing/2014/main" id="{FA3FA39C-9BA8-4F63-8F46-FC7048CC7924}"/>
+                <a16:creationId xmlns:a16="http://schemas.microsoft.com/office/drawing/2014/main" xmlns="" id="{FA3FA39C-9BA8-4F63-8F46-FC7048CC7924}"/>
               </a:ext>
             </a:extLst>
           </p:cNvPr>
@@ -2789,7 +2784,7 @@
           <a:p>
             <a:fld id="{AE2B94A4-0FC4-42EF-8549-9C116B4DC30A}" type="datetimeFigureOut">
               <a:rPr lang="en-IN" smtClean="0"/>
-              <a:t>10-09-2025</a:t>
+              <a:t>13-09-2025</a:t>
             </a:fld>
             <a:endParaRPr lang="en-IN"/>
           </a:p>
@@ -2800,7 +2795,7 @@
           <p:cNvPr id="5" name="Footer Placeholder 4">
             <a:extLst>
               <a:ext uri="{FF2B5EF4-FFF2-40B4-BE49-F238E27FC236}">
-                <a16:creationId xmlns="" xmlns:a16="http://schemas.microsoft.com/office/drawing/2014/main" id="{A494428A-FD42-490B-A597-0C60507B87E1}"/>
+                <a16:creationId xmlns:a16="http://schemas.microsoft.com/office/drawing/2014/main" xmlns="" id="{A494428A-FD42-490B-A597-0C60507B87E1}"/>
               </a:ext>
             </a:extLst>
           </p:cNvPr>
@@ -2825,7 +2820,7 @@
           <p:cNvPr id="6" name="Slide Number Placeholder 5">
             <a:extLst>
               <a:ext uri="{FF2B5EF4-FFF2-40B4-BE49-F238E27FC236}">
-                <a16:creationId xmlns="" xmlns:a16="http://schemas.microsoft.com/office/drawing/2014/main" id="{F55A1D2C-067C-44EC-AE97-78E69FC049C5}"/>
+                <a16:creationId xmlns:a16="http://schemas.microsoft.com/office/drawing/2014/main" xmlns="" id="{F55A1D2C-067C-44EC-AE97-78E69FC049C5}"/>
               </a:ext>
             </a:extLst>
           </p:cNvPr>
@@ -2884,7 +2879,7 @@
           <p:cNvPr id="2" name="Title 1">
             <a:extLst>
               <a:ext uri="{FF2B5EF4-FFF2-40B4-BE49-F238E27FC236}">
-                <a16:creationId xmlns="" xmlns:a16="http://schemas.microsoft.com/office/drawing/2014/main" id="{4F1BEF65-CD20-4C34-8A04-64ED5F4F7005}"/>
+                <a16:creationId xmlns:a16="http://schemas.microsoft.com/office/drawing/2014/main" xmlns="" id="{4F1BEF65-CD20-4C34-8A04-64ED5F4F7005}"/>
               </a:ext>
             </a:extLst>
           </p:cNvPr>
@@ -2913,7 +2908,7 @@
           <p:cNvPr id="3" name="Content Placeholder 2">
             <a:extLst>
               <a:ext uri="{FF2B5EF4-FFF2-40B4-BE49-F238E27FC236}">
-                <a16:creationId xmlns="" xmlns:a16="http://schemas.microsoft.com/office/drawing/2014/main" id="{23A66C2F-A338-447C-8334-410DA49D3A4B}"/>
+                <a16:creationId xmlns:a16="http://schemas.microsoft.com/office/drawing/2014/main" xmlns="" id="{23A66C2F-A338-447C-8334-410DA49D3A4B}"/>
               </a:ext>
             </a:extLst>
           </p:cNvPr>
@@ -2976,7 +2971,7 @@
           <p:cNvPr id="4" name="Content Placeholder 3">
             <a:extLst>
               <a:ext uri="{FF2B5EF4-FFF2-40B4-BE49-F238E27FC236}">
-                <a16:creationId xmlns="" xmlns:a16="http://schemas.microsoft.com/office/drawing/2014/main" id="{169C08DA-5EFC-4FE5-90A0-ECEE9CE0D992}"/>
+                <a16:creationId xmlns:a16="http://schemas.microsoft.com/office/drawing/2014/main" xmlns="" id="{169C08DA-5EFC-4FE5-90A0-ECEE9CE0D992}"/>
               </a:ext>
             </a:extLst>
           </p:cNvPr>
@@ -3039,7 +3034,7 @@
           <p:cNvPr id="5" name="Date Placeholder 4">
             <a:extLst>
               <a:ext uri="{FF2B5EF4-FFF2-40B4-BE49-F238E27FC236}">
-                <a16:creationId xmlns="" xmlns:a16="http://schemas.microsoft.com/office/drawing/2014/main" id="{67C314A3-6DE6-400F-AEE1-FDC5785B7BA5}"/>
+                <a16:creationId xmlns:a16="http://schemas.microsoft.com/office/drawing/2014/main" xmlns="" id="{67C314A3-6DE6-400F-AEE1-FDC5785B7BA5}"/>
               </a:ext>
             </a:extLst>
           </p:cNvPr>
@@ -3057,7 +3052,7 @@
           <a:p>
             <a:fld id="{AE2B94A4-0FC4-42EF-8549-9C116B4DC30A}" type="datetimeFigureOut">
               <a:rPr lang="en-IN" smtClean="0"/>
-              <a:t>10-09-2025</a:t>
+              <a:t>13-09-2025</a:t>
             </a:fld>
             <a:endParaRPr lang="en-IN"/>
           </a:p>
@@ -3068,7 +3063,7 @@
           <p:cNvPr id="6" name="Footer Placeholder 5">
             <a:extLst>
               <a:ext uri="{FF2B5EF4-FFF2-40B4-BE49-F238E27FC236}">
-                <a16:creationId xmlns="" xmlns:a16="http://schemas.microsoft.com/office/drawing/2014/main" id="{B604C892-8B85-4B28-B55C-247D238528A9}"/>
+                <a16:creationId xmlns:a16="http://schemas.microsoft.com/office/drawing/2014/main" xmlns="" id="{B604C892-8B85-4B28-B55C-247D238528A9}"/>
               </a:ext>
             </a:extLst>
           </p:cNvPr>
@@ -3093,7 +3088,7 @@
           <p:cNvPr id="7" name="Slide Number Placeholder 6">
             <a:extLst>
               <a:ext uri="{FF2B5EF4-FFF2-40B4-BE49-F238E27FC236}">
-                <a16:creationId xmlns="" xmlns:a16="http://schemas.microsoft.com/office/drawing/2014/main" id="{8C111E86-FDD1-49EA-90AF-3E41CA4C97DA}"/>
+                <a16:creationId xmlns:a16="http://schemas.microsoft.com/office/drawing/2014/main" xmlns="" id="{8C111E86-FDD1-49EA-90AF-3E41CA4C97DA}"/>
               </a:ext>
             </a:extLst>
           </p:cNvPr>
@@ -3152,7 +3147,7 @@
           <p:cNvPr id="2" name="Title 1">
             <a:extLst>
               <a:ext uri="{FF2B5EF4-FFF2-40B4-BE49-F238E27FC236}">
-                <a16:creationId xmlns="" xmlns:a16="http://schemas.microsoft.com/office/drawing/2014/main" id="{6435CACA-B520-49A3-974D-FB77FC0AAC33}"/>
+                <a16:creationId xmlns:a16="http://schemas.microsoft.com/office/drawing/2014/main" xmlns="" id="{6435CACA-B520-49A3-974D-FB77FC0AAC33}"/>
               </a:ext>
             </a:extLst>
           </p:cNvPr>
@@ -3186,7 +3181,7 @@
           <p:cNvPr id="3" name="Text Placeholder 2">
             <a:extLst>
               <a:ext uri="{FF2B5EF4-FFF2-40B4-BE49-F238E27FC236}">
-                <a16:creationId xmlns="" xmlns:a16="http://schemas.microsoft.com/office/drawing/2014/main" id="{05A18407-4C96-46D3-A104-E6573ABA1ECD}"/>
+                <a16:creationId xmlns:a16="http://schemas.microsoft.com/office/drawing/2014/main" xmlns="" id="{05A18407-4C96-46D3-A104-E6573ABA1ECD}"/>
               </a:ext>
             </a:extLst>
           </p:cNvPr>
@@ -3257,7 +3252,7 @@
           <p:cNvPr id="4" name="Content Placeholder 3">
             <a:extLst>
               <a:ext uri="{FF2B5EF4-FFF2-40B4-BE49-F238E27FC236}">
-                <a16:creationId xmlns="" xmlns:a16="http://schemas.microsoft.com/office/drawing/2014/main" id="{8F33538D-7E17-4C48-AD13-39E0D98D344B}"/>
+                <a16:creationId xmlns:a16="http://schemas.microsoft.com/office/drawing/2014/main" xmlns="" id="{8F33538D-7E17-4C48-AD13-39E0D98D344B}"/>
               </a:ext>
             </a:extLst>
           </p:cNvPr>
@@ -3320,7 +3315,7 @@
           <p:cNvPr id="5" name="Text Placeholder 4">
             <a:extLst>
               <a:ext uri="{FF2B5EF4-FFF2-40B4-BE49-F238E27FC236}">
-                <a16:creationId xmlns="" xmlns:a16="http://schemas.microsoft.com/office/drawing/2014/main" id="{8493A6D5-1E9B-4432-927A-8E1F2B9F69B7}"/>
+                <a16:creationId xmlns:a16="http://schemas.microsoft.com/office/drawing/2014/main" xmlns="" id="{8493A6D5-1E9B-4432-927A-8E1F2B9F69B7}"/>
               </a:ext>
             </a:extLst>
           </p:cNvPr>
@@ -3391,7 +3386,7 @@
           <p:cNvPr id="6" name="Content Placeholder 5">
             <a:extLst>
               <a:ext uri="{FF2B5EF4-FFF2-40B4-BE49-F238E27FC236}">
-                <a16:creationId xmlns="" xmlns:a16="http://schemas.microsoft.com/office/drawing/2014/main" id="{717604CA-9F02-492A-AE93-05449F484516}"/>
+                <a16:creationId xmlns:a16="http://schemas.microsoft.com/office/drawing/2014/main" xmlns="" id="{717604CA-9F02-492A-AE93-05449F484516}"/>
               </a:ext>
             </a:extLst>
           </p:cNvPr>
@@ -3454,7 +3449,7 @@
           <p:cNvPr id="7" name="Date Placeholder 6">
             <a:extLst>
               <a:ext uri="{FF2B5EF4-FFF2-40B4-BE49-F238E27FC236}">
-                <a16:creationId xmlns="" xmlns:a16="http://schemas.microsoft.com/office/drawing/2014/main" id="{44B78754-1740-4D49-AED6-4C736228D4E3}"/>
+                <a16:creationId xmlns:a16="http://schemas.microsoft.com/office/drawing/2014/main" xmlns="" id="{44B78754-1740-4D49-AED6-4C736228D4E3}"/>
               </a:ext>
             </a:extLst>
           </p:cNvPr>
@@ -3472,7 +3467,7 @@
           <a:p>
             <a:fld id="{AE2B94A4-0FC4-42EF-8549-9C116B4DC30A}" type="datetimeFigureOut">
               <a:rPr lang="en-IN" smtClean="0"/>
-              <a:t>10-09-2025</a:t>
+              <a:t>13-09-2025</a:t>
             </a:fld>
             <a:endParaRPr lang="en-IN"/>
           </a:p>
@@ -3483,7 +3478,7 @@
           <p:cNvPr id="8" name="Footer Placeholder 7">
             <a:extLst>
               <a:ext uri="{FF2B5EF4-FFF2-40B4-BE49-F238E27FC236}">
-                <a16:creationId xmlns="" xmlns:a16="http://schemas.microsoft.com/office/drawing/2014/main" id="{51F08A0C-E987-44C0-BC9D-4C0889BB8CD4}"/>
+                <a16:creationId xmlns:a16="http://schemas.microsoft.com/office/drawing/2014/main" xmlns="" id="{51F08A0C-E987-44C0-BC9D-4C0889BB8CD4}"/>
               </a:ext>
             </a:extLst>
           </p:cNvPr>
@@ -3508,7 +3503,7 @@
           <p:cNvPr id="9" name="Slide Number Placeholder 8">
             <a:extLst>
               <a:ext uri="{FF2B5EF4-FFF2-40B4-BE49-F238E27FC236}">
-                <a16:creationId xmlns="" xmlns:a16="http://schemas.microsoft.com/office/drawing/2014/main" id="{CBEAD502-8BC5-4D84-8398-3B59D3AE6950}"/>
+                <a16:creationId xmlns:a16="http://schemas.microsoft.com/office/drawing/2014/main" xmlns="" id="{CBEAD502-8BC5-4D84-8398-3B59D3AE6950}"/>
               </a:ext>
             </a:extLst>
           </p:cNvPr>
@@ -3567,7 +3562,7 @@
           <p:cNvPr id="2" name="Title 1">
             <a:extLst>
               <a:ext uri="{FF2B5EF4-FFF2-40B4-BE49-F238E27FC236}">
-                <a16:creationId xmlns="" xmlns:a16="http://schemas.microsoft.com/office/drawing/2014/main" id="{64028F83-C708-4D10-BCFB-FB6C05C756AE}"/>
+                <a16:creationId xmlns:a16="http://schemas.microsoft.com/office/drawing/2014/main" xmlns="" id="{64028F83-C708-4D10-BCFB-FB6C05C756AE}"/>
               </a:ext>
             </a:extLst>
           </p:cNvPr>
@@ -3596,7 +3591,7 @@
           <p:cNvPr id="3" name="Date Placeholder 2">
             <a:extLst>
               <a:ext uri="{FF2B5EF4-FFF2-40B4-BE49-F238E27FC236}">
-                <a16:creationId xmlns="" xmlns:a16="http://schemas.microsoft.com/office/drawing/2014/main" id="{C00893F9-8A5A-430F-8C7E-2BB02A6D3AD4}"/>
+                <a16:creationId xmlns:a16="http://schemas.microsoft.com/office/drawing/2014/main" xmlns="" id="{C00893F9-8A5A-430F-8C7E-2BB02A6D3AD4}"/>
               </a:ext>
             </a:extLst>
           </p:cNvPr>
@@ -3614,7 +3609,7 @@
           <a:p>
             <a:fld id="{AE2B94A4-0FC4-42EF-8549-9C116B4DC30A}" type="datetimeFigureOut">
               <a:rPr lang="en-IN" smtClean="0"/>
-              <a:t>10-09-2025</a:t>
+              <a:t>13-09-2025</a:t>
             </a:fld>
             <a:endParaRPr lang="en-IN"/>
           </a:p>
@@ -3625,7 +3620,7 @@
           <p:cNvPr id="4" name="Footer Placeholder 3">
             <a:extLst>
               <a:ext uri="{FF2B5EF4-FFF2-40B4-BE49-F238E27FC236}">
-                <a16:creationId xmlns="" xmlns:a16="http://schemas.microsoft.com/office/drawing/2014/main" id="{F229B96B-59A3-4682-B032-BCA241F036AA}"/>
+                <a16:creationId xmlns:a16="http://schemas.microsoft.com/office/drawing/2014/main" xmlns="" id="{F229B96B-59A3-4682-B032-BCA241F036AA}"/>
               </a:ext>
             </a:extLst>
           </p:cNvPr>
@@ -3650,7 +3645,7 @@
           <p:cNvPr id="5" name="Slide Number Placeholder 4">
             <a:extLst>
               <a:ext uri="{FF2B5EF4-FFF2-40B4-BE49-F238E27FC236}">
-                <a16:creationId xmlns="" xmlns:a16="http://schemas.microsoft.com/office/drawing/2014/main" id="{2EB80E67-B755-471A-A550-7BEA107CA870}"/>
+                <a16:creationId xmlns:a16="http://schemas.microsoft.com/office/drawing/2014/main" xmlns="" id="{2EB80E67-B755-471A-A550-7BEA107CA870}"/>
               </a:ext>
             </a:extLst>
           </p:cNvPr>
@@ -3709,7 +3704,7 @@
           <p:cNvPr id="2" name="Date Placeholder 1">
             <a:extLst>
               <a:ext uri="{FF2B5EF4-FFF2-40B4-BE49-F238E27FC236}">
-                <a16:creationId xmlns="" xmlns:a16="http://schemas.microsoft.com/office/drawing/2014/main" id="{4881456A-3E90-4BA8-9121-0C51481D75B9}"/>
+                <a16:creationId xmlns:a16="http://schemas.microsoft.com/office/drawing/2014/main" xmlns="" id="{4881456A-3E90-4BA8-9121-0C51481D75B9}"/>
               </a:ext>
             </a:extLst>
           </p:cNvPr>
@@ -3727,7 +3722,7 @@
           <a:p>
             <a:fld id="{AE2B94A4-0FC4-42EF-8549-9C116B4DC30A}" type="datetimeFigureOut">
               <a:rPr lang="en-IN" smtClean="0"/>
-              <a:t>10-09-2025</a:t>
+              <a:t>13-09-2025</a:t>
             </a:fld>
             <a:endParaRPr lang="en-IN"/>
           </a:p>
@@ -3738,7 +3733,7 @@
           <p:cNvPr id="3" name="Footer Placeholder 2">
             <a:extLst>
               <a:ext uri="{FF2B5EF4-FFF2-40B4-BE49-F238E27FC236}">
-                <a16:creationId xmlns="" xmlns:a16="http://schemas.microsoft.com/office/drawing/2014/main" id="{AB5BFE48-F8B0-47CA-B8B3-05EC7E9E38EA}"/>
+                <a16:creationId xmlns:a16="http://schemas.microsoft.com/office/drawing/2014/main" xmlns="" id="{AB5BFE48-F8B0-47CA-B8B3-05EC7E9E38EA}"/>
               </a:ext>
             </a:extLst>
           </p:cNvPr>
@@ -3763,7 +3758,7 @@
           <p:cNvPr id="4" name="Slide Number Placeholder 3">
             <a:extLst>
               <a:ext uri="{FF2B5EF4-FFF2-40B4-BE49-F238E27FC236}">
-                <a16:creationId xmlns="" xmlns:a16="http://schemas.microsoft.com/office/drawing/2014/main" id="{BC2DC2FD-EC16-447E-8D9A-803BC377C0AC}"/>
+                <a16:creationId xmlns:a16="http://schemas.microsoft.com/office/drawing/2014/main" xmlns="" id="{BC2DC2FD-EC16-447E-8D9A-803BC377C0AC}"/>
               </a:ext>
             </a:extLst>
           </p:cNvPr>
@@ -3822,7 +3817,7 @@
           <p:cNvPr id="2" name="Title 1">
             <a:extLst>
               <a:ext uri="{FF2B5EF4-FFF2-40B4-BE49-F238E27FC236}">
-                <a16:creationId xmlns="" xmlns:a16="http://schemas.microsoft.com/office/drawing/2014/main" id="{C5FFDF0E-1A25-4A74-92BE-EE1CD196B609}"/>
+                <a16:creationId xmlns:a16="http://schemas.microsoft.com/office/drawing/2014/main" xmlns="" id="{C5FFDF0E-1A25-4A74-92BE-EE1CD196B609}"/>
               </a:ext>
             </a:extLst>
           </p:cNvPr>
@@ -3860,7 +3855,7 @@
           <p:cNvPr id="3" name="Content Placeholder 2">
             <a:extLst>
               <a:ext uri="{FF2B5EF4-FFF2-40B4-BE49-F238E27FC236}">
-                <a16:creationId xmlns="" xmlns:a16="http://schemas.microsoft.com/office/drawing/2014/main" id="{CEDF7961-3D36-4A90-AEF7-646ECC21EFD3}"/>
+                <a16:creationId xmlns:a16="http://schemas.microsoft.com/office/drawing/2014/main" xmlns="" id="{CEDF7961-3D36-4A90-AEF7-646ECC21EFD3}"/>
               </a:ext>
             </a:extLst>
           </p:cNvPr>
@@ -3951,7 +3946,7 @@
           <p:cNvPr id="4" name="Text Placeholder 3">
             <a:extLst>
               <a:ext uri="{FF2B5EF4-FFF2-40B4-BE49-F238E27FC236}">
-                <a16:creationId xmlns="" xmlns:a16="http://schemas.microsoft.com/office/drawing/2014/main" id="{8FE9CE21-FFAD-4348-A07B-F2F0FC6915A8}"/>
+                <a16:creationId xmlns:a16="http://schemas.microsoft.com/office/drawing/2014/main" xmlns="" id="{8FE9CE21-FFAD-4348-A07B-F2F0FC6915A8}"/>
               </a:ext>
             </a:extLst>
           </p:cNvPr>
@@ -4022,7 +4017,7 @@
           <p:cNvPr id="5" name="Date Placeholder 4">
             <a:extLst>
               <a:ext uri="{FF2B5EF4-FFF2-40B4-BE49-F238E27FC236}">
-                <a16:creationId xmlns="" xmlns:a16="http://schemas.microsoft.com/office/drawing/2014/main" id="{656AEBF2-D9C9-476E-9D15-A657613D6F9C}"/>
+                <a16:creationId xmlns:a16="http://schemas.microsoft.com/office/drawing/2014/main" xmlns="" id="{656AEBF2-D9C9-476E-9D15-A657613D6F9C}"/>
               </a:ext>
             </a:extLst>
           </p:cNvPr>
@@ -4040,7 +4035,7 @@
           <a:p>
             <a:fld id="{AE2B94A4-0FC4-42EF-8549-9C116B4DC30A}" type="datetimeFigureOut">
               <a:rPr lang="en-IN" smtClean="0"/>
-              <a:t>10-09-2025</a:t>
+              <a:t>13-09-2025</a:t>
             </a:fld>
             <a:endParaRPr lang="en-IN"/>
           </a:p>
@@ -4051,7 +4046,7 @@
           <p:cNvPr id="6" name="Footer Placeholder 5">
             <a:extLst>
               <a:ext uri="{FF2B5EF4-FFF2-40B4-BE49-F238E27FC236}">
-                <a16:creationId xmlns="" xmlns:a16="http://schemas.microsoft.com/office/drawing/2014/main" id="{DCB25D2B-DA51-4342-B3B9-D4B280B033EE}"/>
+                <a16:creationId xmlns:a16="http://schemas.microsoft.com/office/drawing/2014/main" xmlns="" id="{DCB25D2B-DA51-4342-B3B9-D4B280B033EE}"/>
               </a:ext>
             </a:extLst>
           </p:cNvPr>
@@ -4076,7 +4071,7 @@
           <p:cNvPr id="7" name="Slide Number Placeholder 6">
             <a:extLst>
               <a:ext uri="{FF2B5EF4-FFF2-40B4-BE49-F238E27FC236}">
-                <a16:creationId xmlns="" xmlns:a16="http://schemas.microsoft.com/office/drawing/2014/main" id="{55A3FF82-1BA0-4515-B894-78B5F5173417}"/>
+                <a16:creationId xmlns:a16="http://schemas.microsoft.com/office/drawing/2014/main" xmlns="" id="{55A3FF82-1BA0-4515-B894-78B5F5173417}"/>
               </a:ext>
             </a:extLst>
           </p:cNvPr>
@@ -4135,7 +4130,7 @@
           <p:cNvPr id="2" name="Title 1">
             <a:extLst>
               <a:ext uri="{FF2B5EF4-FFF2-40B4-BE49-F238E27FC236}">
-                <a16:creationId xmlns="" xmlns:a16="http://schemas.microsoft.com/office/drawing/2014/main" id="{1D97C9B2-1AC0-4E83-A07B-968354D76F38}"/>
+                <a16:creationId xmlns:a16="http://schemas.microsoft.com/office/drawing/2014/main" xmlns="" id="{1D97C9B2-1AC0-4E83-A07B-968354D76F38}"/>
               </a:ext>
             </a:extLst>
           </p:cNvPr>
@@ -4173,7 +4168,7 @@
           <p:cNvPr id="3" name="Picture Placeholder 2">
             <a:extLst>
               <a:ext uri="{FF2B5EF4-FFF2-40B4-BE49-F238E27FC236}">
-                <a16:creationId xmlns="" xmlns:a16="http://schemas.microsoft.com/office/drawing/2014/main" id="{267B272A-C41D-47E0-9501-5D06928FCF5F}"/>
+                <a16:creationId xmlns:a16="http://schemas.microsoft.com/office/drawing/2014/main" xmlns="" id="{267B272A-C41D-47E0-9501-5D06928FCF5F}"/>
               </a:ext>
             </a:extLst>
           </p:cNvPr>
@@ -4240,7 +4235,7 @@
           <p:cNvPr id="4" name="Text Placeholder 3">
             <a:extLst>
               <a:ext uri="{FF2B5EF4-FFF2-40B4-BE49-F238E27FC236}">
-                <a16:creationId xmlns="" xmlns:a16="http://schemas.microsoft.com/office/drawing/2014/main" id="{38FC354E-0814-48C4-8BD4-149F04DFC869}"/>
+                <a16:creationId xmlns:a16="http://schemas.microsoft.com/office/drawing/2014/main" xmlns="" id="{38FC354E-0814-48C4-8BD4-149F04DFC869}"/>
               </a:ext>
             </a:extLst>
           </p:cNvPr>
@@ -4311,7 +4306,7 @@
           <p:cNvPr id="5" name="Date Placeholder 4">
             <a:extLst>
               <a:ext uri="{FF2B5EF4-FFF2-40B4-BE49-F238E27FC236}">
-                <a16:creationId xmlns="" xmlns:a16="http://schemas.microsoft.com/office/drawing/2014/main" id="{B3E7D3A8-8079-440F-B302-EC0192E05503}"/>
+                <a16:creationId xmlns:a16="http://schemas.microsoft.com/office/drawing/2014/main" xmlns="" id="{B3E7D3A8-8079-440F-B302-EC0192E05503}"/>
               </a:ext>
             </a:extLst>
           </p:cNvPr>
@@ -4329,7 +4324,7 @@
           <a:p>
             <a:fld id="{AE2B94A4-0FC4-42EF-8549-9C116B4DC30A}" type="datetimeFigureOut">
               <a:rPr lang="en-IN" smtClean="0"/>
-              <a:t>10-09-2025</a:t>
+              <a:t>13-09-2025</a:t>
             </a:fld>
             <a:endParaRPr lang="en-IN"/>
           </a:p>
@@ -4340,7 +4335,7 @@
           <p:cNvPr id="6" name="Footer Placeholder 5">
             <a:extLst>
               <a:ext uri="{FF2B5EF4-FFF2-40B4-BE49-F238E27FC236}">
-                <a16:creationId xmlns="" xmlns:a16="http://schemas.microsoft.com/office/drawing/2014/main" id="{E4DE5C99-BD36-4E27-B856-FFC394A28866}"/>
+                <a16:creationId xmlns:a16="http://schemas.microsoft.com/office/drawing/2014/main" xmlns="" id="{E4DE5C99-BD36-4E27-B856-FFC394A28866}"/>
               </a:ext>
             </a:extLst>
           </p:cNvPr>
@@ -4365,7 +4360,7 @@
           <p:cNvPr id="7" name="Slide Number Placeholder 6">
             <a:extLst>
               <a:ext uri="{FF2B5EF4-FFF2-40B4-BE49-F238E27FC236}">
-                <a16:creationId xmlns="" xmlns:a16="http://schemas.microsoft.com/office/drawing/2014/main" id="{0B3059D3-D990-4F1A-AD9C-CF38B75F7869}"/>
+                <a16:creationId xmlns:a16="http://schemas.microsoft.com/office/drawing/2014/main" xmlns="" id="{0B3059D3-D990-4F1A-AD9C-CF38B75F7869}"/>
               </a:ext>
             </a:extLst>
           </p:cNvPr>
@@ -4429,7 +4424,7 @@
           <p:cNvPr id="2" name="Title Placeholder 1">
             <a:extLst>
               <a:ext uri="{FF2B5EF4-FFF2-40B4-BE49-F238E27FC236}">
-                <a16:creationId xmlns="" xmlns:a16="http://schemas.microsoft.com/office/drawing/2014/main" id="{4BFF2548-943F-4540-BC72-248650A3E31D}"/>
+                <a16:creationId xmlns:a16="http://schemas.microsoft.com/office/drawing/2014/main" xmlns="" id="{4BFF2548-943F-4540-BC72-248650A3E31D}"/>
               </a:ext>
             </a:extLst>
           </p:cNvPr>
@@ -4468,7 +4463,7 @@
           <p:cNvPr id="3" name="Text Placeholder 2">
             <a:extLst>
               <a:ext uri="{FF2B5EF4-FFF2-40B4-BE49-F238E27FC236}">
-                <a16:creationId xmlns="" xmlns:a16="http://schemas.microsoft.com/office/drawing/2014/main" id="{56FDDB41-F7EB-43BA-80CD-584C24622859}"/>
+                <a16:creationId xmlns:a16="http://schemas.microsoft.com/office/drawing/2014/main" xmlns="" id="{56FDDB41-F7EB-43BA-80CD-584C24622859}"/>
               </a:ext>
             </a:extLst>
           </p:cNvPr>
@@ -4536,7 +4531,7 @@
           <p:cNvPr id="4" name="Date Placeholder 3">
             <a:extLst>
               <a:ext uri="{FF2B5EF4-FFF2-40B4-BE49-F238E27FC236}">
-                <a16:creationId xmlns="" xmlns:a16="http://schemas.microsoft.com/office/drawing/2014/main" id="{FA0F6219-0833-4902-BEFF-D02E50D38BA6}"/>
+                <a16:creationId xmlns:a16="http://schemas.microsoft.com/office/drawing/2014/main" xmlns="" id="{FA0F6219-0833-4902-BEFF-D02E50D38BA6}"/>
               </a:ext>
             </a:extLst>
           </p:cNvPr>
@@ -4572,7 +4567,7 @@
           <a:p>
             <a:fld id="{AE2B94A4-0FC4-42EF-8549-9C116B4DC30A}" type="datetimeFigureOut">
               <a:rPr lang="en-IN" smtClean="0"/>
-              <a:t>10-09-2025</a:t>
+              <a:t>13-09-2025</a:t>
             </a:fld>
             <a:endParaRPr lang="en-IN"/>
           </a:p>
@@ -4583,7 +4578,7 @@
           <p:cNvPr id="5" name="Footer Placeholder 4">
             <a:extLst>
               <a:ext uri="{FF2B5EF4-FFF2-40B4-BE49-F238E27FC236}">
-                <a16:creationId xmlns="" xmlns:a16="http://schemas.microsoft.com/office/drawing/2014/main" id="{70DD802E-DDC3-4540-A938-ADE559D79F3A}"/>
+                <a16:creationId xmlns:a16="http://schemas.microsoft.com/office/drawing/2014/main" xmlns="" id="{70DD802E-DDC3-4540-A938-ADE559D79F3A}"/>
               </a:ext>
             </a:extLst>
           </p:cNvPr>
@@ -4626,7 +4621,7 @@
           <p:cNvPr id="6" name="Slide Number Placeholder 5">
             <a:extLst>
               <a:ext uri="{FF2B5EF4-FFF2-40B4-BE49-F238E27FC236}">
-                <a16:creationId xmlns="" xmlns:a16="http://schemas.microsoft.com/office/drawing/2014/main" id="{118F8377-7690-4785-A2C2-90458CA29F5C}"/>
+                <a16:creationId xmlns:a16="http://schemas.microsoft.com/office/drawing/2014/main" xmlns="" id="{118F8377-7690-4785-A2C2-90458CA29F5C}"/>
               </a:ext>
             </a:extLst>
           </p:cNvPr>
@@ -4994,7 +4989,7 @@
           <p:cNvPr id="2" name="Title 1">
             <a:extLst>
               <a:ext uri="{FF2B5EF4-FFF2-40B4-BE49-F238E27FC236}">
-                <a16:creationId xmlns="" xmlns:a16="http://schemas.microsoft.com/office/drawing/2014/main" id="{E62CD2ED-974A-4FB7-9D2E-C5AC9466105F}"/>
+                <a16:creationId xmlns:a16="http://schemas.microsoft.com/office/drawing/2014/main" xmlns="" id="{E62CD2ED-974A-4FB7-9D2E-C5AC9466105F}"/>
               </a:ext>
             </a:extLst>
           </p:cNvPr>
@@ -5022,7 +5017,7 @@
           <p:cNvPr id="3" name="Subtitle 2">
             <a:extLst>
               <a:ext uri="{FF2B5EF4-FFF2-40B4-BE49-F238E27FC236}">
-                <a16:creationId xmlns="" xmlns:a16="http://schemas.microsoft.com/office/drawing/2014/main" id="{389EF3AD-46F2-4113-8830-329542169379}"/>
+                <a16:creationId xmlns:a16="http://schemas.microsoft.com/office/drawing/2014/main" xmlns="" id="{389EF3AD-46F2-4113-8830-329542169379}"/>
               </a:ext>
             </a:extLst>
           </p:cNvPr>
@@ -5187,7 +5182,7 @@
           <p:cNvPr id="8" name="Picture 7">
             <a:extLst>
               <a:ext uri="{FF2B5EF4-FFF2-40B4-BE49-F238E27FC236}">
-                <a16:creationId xmlns="" xmlns:a16="http://schemas.microsoft.com/office/drawing/2014/main" id="{50BA28E8-1A63-4C27-A8AF-E41AD0B3C90E}"/>
+                <a16:creationId xmlns:a16="http://schemas.microsoft.com/office/drawing/2014/main" xmlns="" id="{50BA28E8-1A63-4C27-A8AF-E41AD0B3C90E}"/>
               </a:ext>
             </a:extLst>
           </p:cNvPr>
@@ -5242,7 +5237,7 @@
           <p:cNvPr id="12291" name="Rectangle 2">
             <a:extLst>
               <a:ext uri="{FF2B5EF4-FFF2-40B4-BE49-F238E27FC236}">
-                <a16:creationId xmlns="" xmlns:a16="http://schemas.microsoft.com/office/drawing/2014/main" id="{5690D9F4-0D9C-41C0-9673-53FDCD78A131}"/>
+                <a16:creationId xmlns:a16="http://schemas.microsoft.com/office/drawing/2014/main" xmlns="" id="{5690D9F4-0D9C-41C0-9673-53FDCD78A131}"/>
               </a:ext>
             </a:extLst>
           </p:cNvPr>
@@ -5286,7 +5281,7 @@
           <p:cNvPr id="12292" name="Rectangle 3">
             <a:extLst>
               <a:ext uri="{FF2B5EF4-FFF2-40B4-BE49-F238E27FC236}">
-                <a16:creationId xmlns="" xmlns:a16="http://schemas.microsoft.com/office/drawing/2014/main" id="{563A0F18-64D2-4C98-949B-6CF28B45C943}"/>
+                <a16:creationId xmlns:a16="http://schemas.microsoft.com/office/drawing/2014/main" xmlns="" id="{563A0F18-64D2-4C98-949B-6CF28B45C943}"/>
               </a:ext>
             </a:extLst>
           </p:cNvPr>
@@ -5525,7 +5520,7 @@
           <p:cNvPr id="7171" name="Rectangle 2">
             <a:extLst>
               <a:ext uri="{FF2B5EF4-FFF2-40B4-BE49-F238E27FC236}">
-                <a16:creationId xmlns="" xmlns:a16="http://schemas.microsoft.com/office/drawing/2014/main" id="{C23B2348-39FF-4887-848A-A982003EDEE8}"/>
+                <a16:creationId xmlns:a16="http://schemas.microsoft.com/office/drawing/2014/main" xmlns="" id="{C23B2348-39FF-4887-848A-A982003EDEE8}"/>
               </a:ext>
             </a:extLst>
           </p:cNvPr>
@@ -5562,7 +5557,7 @@
           <p:cNvPr id="7172" name="Picture 4" descr="fig07_02">
             <a:extLst>
               <a:ext uri="{FF2B5EF4-FFF2-40B4-BE49-F238E27FC236}">
-                <a16:creationId xmlns="" xmlns:a16="http://schemas.microsoft.com/office/drawing/2014/main" id="{CB254774-CA59-4853-8289-28BDA15CF89D}"/>
+                <a16:creationId xmlns:a16="http://schemas.microsoft.com/office/drawing/2014/main" xmlns="" id="{CB254774-CA59-4853-8289-28BDA15CF89D}"/>
               </a:ext>
             </a:extLst>
           </p:cNvPr>
@@ -5727,7 +5722,7 @@
           <p:cNvPr id="17411" name="Picture 2">
             <a:extLst>
               <a:ext uri="{FF2B5EF4-FFF2-40B4-BE49-F238E27FC236}">
-                <a16:creationId xmlns="" xmlns:a16="http://schemas.microsoft.com/office/drawing/2014/main" id="{7FF11C69-6F39-4B2F-BFF8-065642F5B95C}"/>
+                <a16:creationId xmlns:a16="http://schemas.microsoft.com/office/drawing/2014/main" xmlns="" id="{7FF11C69-6F39-4B2F-BFF8-065642F5B95C}"/>
               </a:ext>
             </a:extLst>
           </p:cNvPr>
@@ -5787,7 +5782,7 @@
           <p:cNvPr id="17412" name="Rectangle 3">
             <a:extLst>
               <a:ext uri="{FF2B5EF4-FFF2-40B4-BE49-F238E27FC236}">
-                <a16:creationId xmlns="" xmlns:a16="http://schemas.microsoft.com/office/drawing/2014/main" id="{353D1E98-F769-4F2D-AC24-316F74B7A99C}"/>
+                <a16:creationId xmlns:a16="http://schemas.microsoft.com/office/drawing/2014/main" xmlns="" id="{353D1E98-F769-4F2D-AC24-316F74B7A99C}"/>
               </a:ext>
             </a:extLst>
           </p:cNvPr>
@@ -5821,7 +5816,7 @@
           <p:cNvPr id="17413" name="Rectangle 4">
             <a:extLst>
               <a:ext uri="{FF2B5EF4-FFF2-40B4-BE49-F238E27FC236}">
-                <a16:creationId xmlns="" xmlns:a16="http://schemas.microsoft.com/office/drawing/2014/main" id="{D26F428D-853E-496E-A1F8-7C52C490740B}"/>
+                <a16:creationId xmlns:a16="http://schemas.microsoft.com/office/drawing/2014/main" xmlns="" id="{D26F428D-853E-496E-A1F8-7C52C490740B}"/>
               </a:ext>
             </a:extLst>
           </p:cNvPr>
@@ -5877,7 +5872,7 @@
           <p:cNvPr id="17414" name="Rectangle 5">
             <a:extLst>
               <a:ext uri="{FF2B5EF4-FFF2-40B4-BE49-F238E27FC236}">
-                <a16:creationId xmlns="" xmlns:a16="http://schemas.microsoft.com/office/drawing/2014/main" id="{57F03BC9-EA42-49B7-BF66-6FB8BC24BBAE}"/>
+                <a16:creationId xmlns:a16="http://schemas.microsoft.com/office/drawing/2014/main" xmlns="" id="{57F03BC9-EA42-49B7-BF66-6FB8BC24BBAE}"/>
               </a:ext>
             </a:extLst>
           </p:cNvPr>
@@ -6067,525 +6062,6 @@
         </p:txBody>
       </p:sp>
     </p:spTree>
-  </p:cSld>
-  <p:clrMapOvr>
-    <a:masterClrMapping/>
-  </p:clrMapOvr>
-</p:sld>
-</file>
-
-<file path=ppt/slides/slide16.xml><?xml version="1.0" encoding="utf-8"?>
-<p:sld xmlns:a="http://schemas.openxmlformats.org/drawingml/2006/main" xmlns:r="http://schemas.openxmlformats.org/officeDocument/2006/relationships" xmlns:p="http://schemas.openxmlformats.org/presentationml/2006/main">
-  <p:cSld>
-    <p:spTree>
-      <p:nvGrpSpPr>
-        <p:cNvPr id="1" name=""/>
-        <p:cNvGrpSpPr/>
-        <p:nvPr/>
-      </p:nvGrpSpPr>
-      <p:grpSpPr>
-        <a:xfrm>
-          <a:off x="0" y="0"/>
-          <a:ext cx="0" cy="0"/>
-          <a:chOff x="0" y="0"/>
-          <a:chExt cx="0" cy="0"/>
-        </a:xfrm>
-      </p:grpSpPr>
-      <p:sp>
-        <p:nvSpPr>
-          <p:cNvPr id="2" name="Title 1">
-            <a:extLst>
-              <a:ext uri="{FF2B5EF4-FFF2-40B4-BE49-F238E27FC236}">
-                <a16:creationId xmlns="" xmlns:a16="http://schemas.microsoft.com/office/drawing/2014/main" id="{292A3FB6-48A4-4032-BC47-0D17C709BC9B}"/>
-              </a:ext>
-            </a:extLst>
-          </p:cNvPr>
-          <p:cNvSpPr>
-            <a:spLocks noGrp="1"/>
-          </p:cNvSpPr>
-          <p:nvPr>
-            <p:ph type="title"/>
-          </p:nvPr>
-        </p:nvSpPr>
-        <p:spPr/>
-        <p:txBody>
-          <a:bodyPr/>
-          <a:lstStyle/>
-          <a:p>
-            <a:r>
-              <a:rPr lang="en-IN" dirty="0"/>
-              <a:t>Practical - JOIN</a:t>
-            </a:r>
-          </a:p>
-        </p:txBody>
-      </p:sp>
-      <p:sp>
-        <p:nvSpPr>
-          <p:cNvPr id="3" name="Content Placeholder 2">
-            <a:extLst>
-              <a:ext uri="{FF2B5EF4-FFF2-40B4-BE49-F238E27FC236}">
-                <a16:creationId xmlns="" xmlns:a16="http://schemas.microsoft.com/office/drawing/2014/main" id="{B89B2F14-2A5F-46B9-BB39-8810E9A5CCE8}"/>
-              </a:ext>
-            </a:extLst>
-          </p:cNvPr>
-          <p:cNvSpPr>
-            <a:spLocks noGrp="1"/>
-          </p:cNvSpPr>
-          <p:nvPr>
-            <p:ph idx="1"/>
-          </p:nvPr>
-        </p:nvSpPr>
-        <p:spPr/>
-        <p:txBody>
-          <a:bodyPr>
-            <a:normAutofit lnSpcReduction="10000"/>
-          </a:bodyPr>
-          <a:lstStyle/>
-          <a:p>
-            <a:pPr algn="just"/>
-            <a:r>
-              <a:rPr lang="en-IN" dirty="0"/>
-              <a:t>In relational databases, such as SQL Server, Oracle, MySQL, and others, data is stored in multiple tables that are related to each other with a common key value. Accordingly, there is a constant need to extract records from two or more tables into a results table based on some condition. In SQL Server, this can be easily accomplished with the SQL JOIN clause.</a:t>
-            </a:r>
-          </a:p>
-          <a:p>
-            <a:pPr algn="just"/>
-            <a:endParaRPr lang="en-IN" dirty="0"/>
-          </a:p>
-          <a:p>
-            <a:pPr algn="just"/>
-            <a:r>
-              <a:rPr lang="en-IN" dirty="0"/>
-              <a:t>JOIN is an SQL clause used to query and access data from multiple tables, based on logical relationships between those tables.</a:t>
-            </a:r>
-          </a:p>
-          <a:p>
-            <a:pPr algn="just"/>
-            <a:r>
-              <a:rPr lang="en-IN" dirty="0"/>
-              <a:t>In other words, JOINS indicate how SQL Server should use data from one table to select the rows from another table.</a:t>
-            </a:r>
-          </a:p>
-        </p:txBody>
-      </p:sp>
-    </p:spTree>
-    <p:extLst>
-      <p:ext uri="{BB962C8B-B14F-4D97-AF65-F5344CB8AC3E}">
-        <p14:creationId xmlns:p14="http://schemas.microsoft.com/office/powerpoint/2010/main" val="66440815"/>
-      </p:ext>
-    </p:extLst>
-  </p:cSld>
-  <p:clrMapOvr>
-    <a:masterClrMapping/>
-  </p:clrMapOvr>
-</p:sld>
-</file>
-
-<file path=ppt/slides/slide17.xml><?xml version="1.0" encoding="utf-8"?>
-<p:sld xmlns:a="http://schemas.openxmlformats.org/drawingml/2006/main" xmlns:r="http://schemas.openxmlformats.org/officeDocument/2006/relationships" xmlns:p="http://schemas.openxmlformats.org/presentationml/2006/main">
-  <p:cSld>
-    <p:spTree>
-      <p:nvGrpSpPr>
-        <p:cNvPr id="1" name=""/>
-        <p:cNvGrpSpPr/>
-        <p:nvPr/>
-      </p:nvGrpSpPr>
-      <p:grpSpPr>
-        <a:xfrm>
-          <a:off x="0" y="0"/>
-          <a:ext cx="0" cy="0"/>
-          <a:chOff x="0" y="0"/>
-          <a:chExt cx="0" cy="0"/>
-        </a:xfrm>
-      </p:grpSpPr>
-      <p:sp>
-        <p:nvSpPr>
-          <p:cNvPr id="2" name="Title 1">
-            <a:extLst>
-              <a:ext uri="{FF2B5EF4-FFF2-40B4-BE49-F238E27FC236}">
-                <a16:creationId xmlns="" xmlns:a16="http://schemas.microsoft.com/office/drawing/2014/main" id="{66B84615-3895-4DBF-B3C9-239887C2D868}"/>
-              </a:ext>
-            </a:extLst>
-          </p:cNvPr>
-          <p:cNvSpPr>
-            <a:spLocks noGrp="1"/>
-          </p:cNvSpPr>
-          <p:nvPr>
-            <p:ph type="title"/>
-          </p:nvPr>
-        </p:nvSpPr>
-        <p:spPr/>
-        <p:txBody>
-          <a:bodyPr/>
-          <a:lstStyle/>
-          <a:p>
-            <a:r>
-              <a:rPr lang="en-IN" dirty="0"/>
-              <a:t>Inner join</a:t>
-            </a:r>
-          </a:p>
-        </p:txBody>
-      </p:sp>
-      <p:sp>
-        <p:nvSpPr>
-          <p:cNvPr id="3" name="Content Placeholder 2">
-            <a:extLst>
-              <a:ext uri="{FF2B5EF4-FFF2-40B4-BE49-F238E27FC236}">
-                <a16:creationId xmlns="" xmlns:a16="http://schemas.microsoft.com/office/drawing/2014/main" id="{2D6D5C10-C7A2-42FA-928C-C81878A838D5}"/>
-              </a:ext>
-            </a:extLst>
-          </p:cNvPr>
-          <p:cNvSpPr>
-            <a:spLocks noGrp="1"/>
-          </p:cNvSpPr>
-          <p:nvPr>
-            <p:ph idx="1"/>
-          </p:nvPr>
-        </p:nvSpPr>
-        <p:spPr>
-          <a:xfrm>
-            <a:off x="838200" y="1825625"/>
-            <a:ext cx="10515600" cy="1325563"/>
-          </a:xfrm>
-        </p:spPr>
-        <p:txBody>
-          <a:bodyPr/>
-          <a:lstStyle/>
-          <a:p>
-            <a:r>
-              <a:rPr lang="en-IN" dirty="0"/>
-              <a:t>INNER JOIN statement returns only those records or rows that have matching values and is used to retrieve data that appears in both tables.</a:t>
-            </a:r>
-          </a:p>
-        </p:txBody>
-      </p:sp>
-      <p:pic>
-        <p:nvPicPr>
-          <p:cNvPr id="1026" name="Picture 2" descr="Iner SQL JOIN">
-            <a:extLst>
-              <a:ext uri="{FF2B5EF4-FFF2-40B4-BE49-F238E27FC236}">
-                <a16:creationId xmlns="" xmlns:a16="http://schemas.microsoft.com/office/drawing/2014/main" id="{EB60BD33-8961-4EC8-8F4A-F66913584A0F}"/>
-              </a:ext>
-            </a:extLst>
-          </p:cNvPr>
-          <p:cNvPicPr>
-            <a:picLocks noChangeAspect="1" noChangeArrowheads="1"/>
-          </p:cNvPicPr>
-          <p:nvPr/>
-        </p:nvPicPr>
-        <p:blipFill>
-          <a:blip r:embed="rId2">
-            <a:extLst>
-              <a:ext uri="{28A0092B-C50C-407E-A947-70E740481C1C}">
-                <a14:useLocalDpi xmlns:a14="http://schemas.microsoft.com/office/drawing/2010/main" val="0"/>
-              </a:ext>
-            </a:extLst>
-          </a:blip>
-          <a:srcRect/>
-          <a:stretch>
-            <a:fillRect/>
-          </a:stretch>
-        </p:blipFill>
-        <p:spPr bwMode="auto">
-          <a:xfrm>
-            <a:off x="2951284" y="3041015"/>
-            <a:ext cx="5753100" cy="3451860"/>
-          </a:xfrm>
-          <a:prstGeom prst="rect">
-            <a:avLst/>
-          </a:prstGeom>
-          <a:noFill/>
-          <a:extLst>
-            <a:ext uri="{909E8E84-426E-40DD-AFC4-6F175D3DCCD1}">
-              <a14:hiddenFill xmlns:a14="http://schemas.microsoft.com/office/drawing/2010/main">
-                <a:solidFill>
-                  <a:srgbClr val="FFFFFF"/>
-                </a:solidFill>
-              </a14:hiddenFill>
-            </a:ext>
-          </a:extLst>
-        </p:spPr>
-      </p:pic>
-    </p:spTree>
-    <p:extLst>
-      <p:ext uri="{BB962C8B-B14F-4D97-AF65-F5344CB8AC3E}">
-        <p14:creationId xmlns:p14="http://schemas.microsoft.com/office/powerpoint/2010/main" val="1796689045"/>
-      </p:ext>
-    </p:extLst>
-  </p:cSld>
-  <p:clrMapOvr>
-    <a:masterClrMapping/>
-  </p:clrMapOvr>
-</p:sld>
-</file>
-
-<file path=ppt/slides/slide18.xml><?xml version="1.0" encoding="utf-8"?>
-<p:sld xmlns:a="http://schemas.openxmlformats.org/drawingml/2006/main" xmlns:r="http://schemas.openxmlformats.org/officeDocument/2006/relationships" xmlns:p="http://schemas.openxmlformats.org/presentationml/2006/main">
-  <p:cSld>
-    <p:spTree>
-      <p:nvGrpSpPr>
-        <p:cNvPr id="1" name=""/>
-        <p:cNvGrpSpPr/>
-        <p:nvPr/>
-      </p:nvGrpSpPr>
-      <p:grpSpPr>
-        <a:xfrm>
-          <a:off x="0" y="0"/>
-          <a:ext cx="0" cy="0"/>
-          <a:chOff x="0" y="0"/>
-          <a:chExt cx="0" cy="0"/>
-        </a:xfrm>
-      </p:grpSpPr>
-      <p:sp>
-        <p:nvSpPr>
-          <p:cNvPr id="2" name="Title 1">
-            <a:extLst>
-              <a:ext uri="{FF2B5EF4-FFF2-40B4-BE49-F238E27FC236}">
-                <a16:creationId xmlns="" xmlns:a16="http://schemas.microsoft.com/office/drawing/2014/main" id="{185037DC-9BED-4293-97E7-6CD13B59AEFF}"/>
-              </a:ext>
-            </a:extLst>
-          </p:cNvPr>
-          <p:cNvSpPr>
-            <a:spLocks noGrp="1"/>
-          </p:cNvSpPr>
-          <p:nvPr>
-            <p:ph type="title"/>
-          </p:nvPr>
-        </p:nvSpPr>
-        <p:spPr/>
-        <p:txBody>
-          <a:bodyPr/>
-          <a:lstStyle/>
-          <a:p>
-            <a:r>
-              <a:rPr lang="en-IN" dirty="0"/>
-              <a:t>Outer Join – Left Outer and Right Outer</a:t>
-            </a:r>
-          </a:p>
-        </p:txBody>
-      </p:sp>
-      <p:sp>
-        <p:nvSpPr>
-          <p:cNvPr id="3" name="Content Placeholder 2">
-            <a:extLst>
-              <a:ext uri="{FF2B5EF4-FFF2-40B4-BE49-F238E27FC236}">
-                <a16:creationId xmlns="" xmlns:a16="http://schemas.microsoft.com/office/drawing/2014/main" id="{E901829F-1330-4DFA-B59F-45061998AC6F}"/>
-              </a:ext>
-            </a:extLst>
-          </p:cNvPr>
-          <p:cNvSpPr>
-            <a:spLocks noGrp="1"/>
-          </p:cNvSpPr>
-          <p:nvPr>
-            <p:ph idx="1"/>
-          </p:nvPr>
-        </p:nvSpPr>
-        <p:spPr>
-          <a:xfrm>
-            <a:off x="838200" y="1825625"/>
-            <a:ext cx="10515600" cy="903507"/>
-          </a:xfrm>
-        </p:spPr>
-        <p:txBody>
-          <a:bodyPr/>
-          <a:lstStyle/>
-          <a:p>
-            <a:r>
-              <a:rPr lang="en-IN" dirty="0"/>
-              <a:t>OUTER JOIN, will retrieve not only the matching rows but also the unmatched rows as well.</a:t>
-            </a:r>
-          </a:p>
-        </p:txBody>
-      </p:sp>
-      <p:pic>
-        <p:nvPicPr>
-          <p:cNvPr id="2050" name="Picture 2" descr="SQL Server OUTER JOIN">
-            <a:extLst>
-              <a:ext uri="{FF2B5EF4-FFF2-40B4-BE49-F238E27FC236}">
-                <a16:creationId xmlns="" xmlns:a16="http://schemas.microsoft.com/office/drawing/2014/main" id="{A8944339-F43C-42FA-AEA4-0CE786F2B25A}"/>
-              </a:ext>
-            </a:extLst>
-          </p:cNvPr>
-          <p:cNvPicPr>
-            <a:picLocks noChangeAspect="1" noChangeArrowheads="1"/>
-          </p:cNvPicPr>
-          <p:nvPr/>
-        </p:nvPicPr>
-        <p:blipFill>
-          <a:blip r:embed="rId2">
-            <a:extLst>
-              <a:ext uri="{28A0092B-C50C-407E-A947-70E740481C1C}">
-                <a14:useLocalDpi xmlns:a14="http://schemas.microsoft.com/office/drawing/2010/main" val="0"/>
-              </a:ext>
-            </a:extLst>
-          </a:blip>
-          <a:srcRect/>
-          <a:stretch>
-            <a:fillRect/>
-          </a:stretch>
-        </p:blipFill>
-        <p:spPr bwMode="auto">
-          <a:xfrm>
-            <a:off x="3330233" y="3019278"/>
-            <a:ext cx="5531534" cy="3318920"/>
-          </a:xfrm>
-          <a:prstGeom prst="rect">
-            <a:avLst/>
-          </a:prstGeom>
-          <a:noFill/>
-          <a:extLst>
-            <a:ext uri="{909E8E84-426E-40DD-AFC4-6F175D3DCCD1}">
-              <a14:hiddenFill xmlns:a14="http://schemas.microsoft.com/office/drawing/2010/main">
-                <a:solidFill>
-                  <a:srgbClr val="FFFFFF"/>
-                </a:solidFill>
-              </a14:hiddenFill>
-            </a:ext>
-          </a:extLst>
-        </p:spPr>
-      </p:pic>
-    </p:spTree>
-    <p:extLst>
-      <p:ext uri="{BB962C8B-B14F-4D97-AF65-F5344CB8AC3E}">
-        <p14:creationId xmlns:p14="http://schemas.microsoft.com/office/powerpoint/2010/main" val="1704155512"/>
-      </p:ext>
-    </p:extLst>
-  </p:cSld>
-  <p:clrMapOvr>
-    <a:masterClrMapping/>
-  </p:clrMapOvr>
-</p:sld>
-</file>
-
-<file path=ppt/slides/slide19.xml><?xml version="1.0" encoding="utf-8"?>
-<p:sld xmlns:a="http://schemas.openxmlformats.org/drawingml/2006/main" xmlns:r="http://schemas.openxmlformats.org/officeDocument/2006/relationships" xmlns:p="http://schemas.openxmlformats.org/presentationml/2006/main">
-  <p:cSld>
-    <p:spTree>
-      <p:nvGrpSpPr>
-        <p:cNvPr id="1" name=""/>
-        <p:cNvGrpSpPr/>
-        <p:nvPr/>
-      </p:nvGrpSpPr>
-      <p:grpSpPr>
-        <a:xfrm>
-          <a:off x="0" y="0"/>
-          <a:ext cx="0" cy="0"/>
-          <a:chOff x="0" y="0"/>
-          <a:chExt cx="0" cy="0"/>
-        </a:xfrm>
-      </p:grpSpPr>
-      <p:sp>
-        <p:nvSpPr>
-          <p:cNvPr id="2" name="Title 1">
-            <a:extLst>
-              <a:ext uri="{FF2B5EF4-FFF2-40B4-BE49-F238E27FC236}">
-                <a16:creationId xmlns="" xmlns:a16="http://schemas.microsoft.com/office/drawing/2014/main" id="{94C91C4F-BD1F-4123-A430-45D121F74A70}"/>
-              </a:ext>
-            </a:extLst>
-          </p:cNvPr>
-          <p:cNvSpPr>
-            <a:spLocks noGrp="1"/>
-          </p:cNvSpPr>
-          <p:nvPr>
-            <p:ph type="title"/>
-          </p:nvPr>
-        </p:nvSpPr>
-        <p:spPr>
-          <a:xfrm>
-            <a:off x="838200" y="365125"/>
-            <a:ext cx="10515600" cy="478937"/>
-          </a:xfrm>
-        </p:spPr>
-        <p:txBody>
-          <a:bodyPr>
-            <a:normAutofit fontScale="90000"/>
-          </a:bodyPr>
-          <a:lstStyle/>
-          <a:p>
-            <a:r>
-              <a:rPr lang="en-IN" dirty="0"/>
-              <a:t>Cross Join</a:t>
-            </a:r>
-          </a:p>
-        </p:txBody>
-      </p:sp>
-      <p:sp>
-        <p:nvSpPr>
-          <p:cNvPr id="3" name="Content Placeholder 2">
-            <a:extLst>
-              <a:ext uri="{FF2B5EF4-FFF2-40B4-BE49-F238E27FC236}">
-                <a16:creationId xmlns="" xmlns:a16="http://schemas.microsoft.com/office/drawing/2014/main" id="{B70BDC87-EE66-465B-B129-2979A59E0C70}"/>
-              </a:ext>
-            </a:extLst>
-          </p:cNvPr>
-          <p:cNvSpPr>
-            <a:spLocks noGrp="1"/>
-          </p:cNvSpPr>
-          <p:nvPr>
-            <p:ph idx="1"/>
-          </p:nvPr>
-        </p:nvSpPr>
-        <p:spPr>
-          <a:xfrm>
-            <a:off x="838200" y="1162881"/>
-            <a:ext cx="10515600" cy="2887052"/>
-          </a:xfrm>
-        </p:spPr>
-        <p:txBody>
-          <a:bodyPr/>
-          <a:lstStyle/>
-          <a:p>
-            <a:r>
-              <a:rPr lang="en-IN" dirty="0"/>
-              <a:t>The CROSS JOIN command in SQL, also known as a cartesian join, returns all combinations of rows from each table. Envision that you need to find all combinations of size and </a:t>
-            </a:r>
-            <a:r>
-              <a:rPr lang="en-IN" dirty="0" err="1"/>
-              <a:t>color</a:t>
-            </a:r>
-            <a:r>
-              <a:rPr lang="en-IN" dirty="0"/>
-              <a:t>. In that case, a CROSS JOIN will be an asset. Note, that this join does not need any condition to join two tables. In fact, CROSS JOIN joins every row from the first table with every row from the second table and its result comprises all combinations of records in two tables.</a:t>
-            </a:r>
-          </a:p>
-        </p:txBody>
-      </p:sp>
-      <p:pic>
-        <p:nvPicPr>
-          <p:cNvPr id="4" name="Picture 3">
-            <a:extLst>
-              <a:ext uri="{FF2B5EF4-FFF2-40B4-BE49-F238E27FC236}">
-                <a16:creationId xmlns="" xmlns:a16="http://schemas.microsoft.com/office/drawing/2014/main" id="{D8EE5040-E2E3-46B8-8D42-61DEB4AD607A}"/>
-              </a:ext>
-            </a:extLst>
-          </p:cNvPr>
-          <p:cNvPicPr>
-            <a:picLocks noChangeAspect="1"/>
-          </p:cNvPicPr>
-          <p:nvPr/>
-        </p:nvPicPr>
-        <p:blipFill>
-          <a:blip r:embed="rId2"/>
-          <a:stretch>
-            <a:fillRect/>
-          </a:stretch>
-        </p:blipFill>
-        <p:spPr>
-          <a:xfrm>
-            <a:off x="3420722" y="4049933"/>
-            <a:ext cx="5006116" cy="2606407"/>
-          </a:xfrm>
-          <a:prstGeom prst="rect">
-            <a:avLst/>
-          </a:prstGeom>
-        </p:spPr>
-      </p:pic>
-    </p:spTree>
-    <p:extLst>
-      <p:ext uri="{BB962C8B-B14F-4D97-AF65-F5344CB8AC3E}">
-        <p14:creationId xmlns:p14="http://schemas.microsoft.com/office/powerpoint/2010/main" val="1536958896"/>
-      </p:ext>
-    </p:extLst>
   </p:cSld>
   <p:clrMapOvr>
     <a:masterClrMapping/>
@@ -6727,206 +6203,6 @@
         </p:txBody>
       </p:sp>
     </p:spTree>
-  </p:cSld>
-  <p:clrMapOvr>
-    <a:masterClrMapping/>
-  </p:clrMapOvr>
-</p:sld>
-</file>
-
-<file path=ppt/slides/slide20.xml><?xml version="1.0" encoding="utf-8"?>
-<p:sld xmlns:a="http://schemas.openxmlformats.org/drawingml/2006/main" xmlns:r="http://schemas.openxmlformats.org/officeDocument/2006/relationships" xmlns:p="http://schemas.openxmlformats.org/presentationml/2006/main">
-  <p:cSld>
-    <p:spTree>
-      <p:nvGrpSpPr>
-        <p:cNvPr id="1" name=""/>
-        <p:cNvGrpSpPr/>
-        <p:nvPr/>
-      </p:nvGrpSpPr>
-      <p:grpSpPr>
-        <a:xfrm>
-          <a:off x="0" y="0"/>
-          <a:ext cx="0" cy="0"/>
-          <a:chOff x="0" y="0"/>
-          <a:chExt cx="0" cy="0"/>
-        </a:xfrm>
-      </p:grpSpPr>
-      <p:sp>
-        <p:nvSpPr>
-          <p:cNvPr id="2" name="Title 1">
-            <a:extLst>
-              <a:ext uri="{FF2B5EF4-FFF2-40B4-BE49-F238E27FC236}">
-                <a16:creationId xmlns="" xmlns:a16="http://schemas.microsoft.com/office/drawing/2014/main" id="{757216F3-C1D0-4EC1-98E0-470FCC2FA06D}"/>
-              </a:ext>
-            </a:extLst>
-          </p:cNvPr>
-          <p:cNvSpPr>
-            <a:spLocks noGrp="1"/>
-          </p:cNvSpPr>
-          <p:nvPr>
-            <p:ph type="title"/>
-          </p:nvPr>
-        </p:nvSpPr>
-        <p:spPr>
-          <a:xfrm>
-            <a:off x="613117" y="140043"/>
-            <a:ext cx="10515600" cy="315912"/>
-          </a:xfrm>
-        </p:spPr>
-        <p:txBody>
-          <a:bodyPr>
-            <a:normAutofit fontScale="90000"/>
-          </a:bodyPr>
-          <a:lstStyle/>
-          <a:p>
-            <a:r>
-              <a:rPr lang="en-IN" dirty="0"/>
-              <a:t>Syntax</a:t>
-            </a:r>
-          </a:p>
-        </p:txBody>
-      </p:sp>
-      <p:sp>
-        <p:nvSpPr>
-          <p:cNvPr id="3" name="Content Placeholder 2">
-            <a:extLst>
-              <a:ext uri="{FF2B5EF4-FFF2-40B4-BE49-F238E27FC236}">
-                <a16:creationId xmlns="" xmlns:a16="http://schemas.microsoft.com/office/drawing/2014/main" id="{705303D2-6280-4CFD-9444-625488DBA956}"/>
-              </a:ext>
-            </a:extLst>
-          </p:cNvPr>
-          <p:cNvSpPr>
-            <a:spLocks noGrp="1"/>
-          </p:cNvSpPr>
-          <p:nvPr>
-            <p:ph idx="1"/>
-          </p:nvPr>
-        </p:nvSpPr>
-        <p:spPr>
-          <a:xfrm>
-            <a:off x="492369" y="773723"/>
-            <a:ext cx="11197883" cy="5809957"/>
-          </a:xfrm>
-        </p:spPr>
-        <p:txBody>
-          <a:bodyPr>
-            <a:normAutofit/>
-          </a:bodyPr>
-          <a:lstStyle/>
-          <a:p>
-            <a:pPr marL="0" indent="0">
-              <a:buNone/>
-            </a:pPr>
-            <a:r>
-              <a:rPr lang="en-IN" dirty="0"/>
-              <a:t>SELECT Table1.Column1,Table1.Column2,Table2.Column1,....</a:t>
-            </a:r>
-          </a:p>
-          <a:p>
-            <a:pPr marL="0" indent="0">
-              <a:buNone/>
-            </a:pPr>
-            <a:r>
-              <a:rPr lang="en-IN" dirty="0"/>
-              <a:t>FROM Table1</a:t>
-            </a:r>
-          </a:p>
-          <a:p>
-            <a:pPr marL="0" indent="0">
-              <a:buNone/>
-            </a:pPr>
-            <a:r>
-              <a:rPr lang="en-IN" dirty="0"/>
-              <a:t>INNER JOIN Table2</a:t>
-            </a:r>
-          </a:p>
-          <a:p>
-            <a:pPr marL="0" indent="0">
-              <a:buNone/>
-            </a:pPr>
-            <a:r>
-              <a:rPr lang="en-IN" dirty="0"/>
-              <a:t>ON Table1.MatchingColumnName = Table2.MatchingColumnName;</a:t>
-            </a:r>
-          </a:p>
-          <a:p>
-            <a:pPr marL="0" indent="0">
-              <a:buNone/>
-            </a:pPr>
-            <a:endParaRPr lang="en-IN" dirty="0"/>
-          </a:p>
-          <a:p>
-            <a:pPr marL="0" indent="0">
-              <a:buNone/>
-            </a:pPr>
-            <a:r>
-              <a:rPr lang="en-IN" dirty="0"/>
-              <a:t>SELECT Table1.Column1,Table1.Column2,Table2.Column1,....</a:t>
-            </a:r>
-          </a:p>
-          <a:p>
-            <a:pPr marL="0" indent="0">
-              <a:buNone/>
-            </a:pPr>
-            <a:r>
-              <a:rPr lang="en-IN" dirty="0"/>
-              <a:t>FROM Table1</a:t>
-            </a:r>
-          </a:p>
-          <a:p>
-            <a:pPr marL="0" indent="0">
-              <a:buNone/>
-            </a:pPr>
-            <a:r>
-              <a:rPr lang="en-IN" dirty="0"/>
-              <a:t>FULL JOIN Table2</a:t>
-            </a:r>
-          </a:p>
-          <a:p>
-            <a:pPr marL="0" indent="0">
-              <a:buNone/>
-            </a:pPr>
-            <a:r>
-              <a:rPr lang="en-IN" dirty="0"/>
-              <a:t>ON Table1.MatchingColumnName = Table2.MatchingColumnName;</a:t>
-            </a:r>
-          </a:p>
-          <a:p>
-            <a:pPr marL="0" indent="0">
-              <a:buNone/>
-            </a:pPr>
-            <a:endParaRPr lang="en-IN" dirty="0"/>
-          </a:p>
-          <a:p>
-            <a:pPr marL="0" indent="0">
-              <a:buNone/>
-            </a:pPr>
-            <a:r>
-              <a:rPr lang="en-IN" dirty="0"/>
-              <a:t>Similarly can write for </a:t>
-            </a:r>
-            <a:r>
-              <a:rPr lang="en-IN"/>
-              <a:t>Left Join </a:t>
-            </a:r>
-            <a:r>
-              <a:rPr lang="en-IN" dirty="0"/>
-              <a:t>an </a:t>
-            </a:r>
-            <a:r>
-              <a:rPr lang="en-IN"/>
-              <a:t>Right Join</a:t>
-            </a:r>
-            <a:endParaRPr lang="en-IN" dirty="0"/>
-          </a:p>
-        </p:txBody>
-      </p:sp>
-    </p:spTree>
-    <p:extLst>
-      <p:ext uri="{BB962C8B-B14F-4D97-AF65-F5344CB8AC3E}">
-        <p14:creationId xmlns:p14="http://schemas.microsoft.com/office/powerpoint/2010/main" val="2279482416"/>
-      </p:ext>
-    </p:extLst>
   </p:cSld>
   <p:clrMapOvr>
     <a:masterClrMapping/>
@@ -7228,7 +6504,7 @@
           <p:cNvPr id="2" name="Title 1">
             <a:extLst>
               <a:ext uri="{FF2B5EF4-FFF2-40B4-BE49-F238E27FC236}">
-                <a16:creationId xmlns="" xmlns:a16="http://schemas.microsoft.com/office/drawing/2014/main" id="{0293D3E0-FE55-41A7-8B14-2742DB66177F}"/>
+                <a16:creationId xmlns:a16="http://schemas.microsoft.com/office/drawing/2014/main" xmlns="" id="{0293D3E0-FE55-41A7-8B14-2742DB66177F}"/>
               </a:ext>
             </a:extLst>
           </p:cNvPr>
@@ -7256,7 +6532,7 @@
           <p:cNvPr id="3" name="Content Placeholder 2">
             <a:extLst>
               <a:ext uri="{FF2B5EF4-FFF2-40B4-BE49-F238E27FC236}">
-                <a16:creationId xmlns="" xmlns:a16="http://schemas.microsoft.com/office/drawing/2014/main" id="{4F283643-62AD-4EE4-BF39-09E1BE4288CD}"/>
+                <a16:creationId xmlns:a16="http://schemas.microsoft.com/office/drawing/2014/main" xmlns="" id="{4F283643-62AD-4EE4-BF39-09E1BE4288CD}"/>
               </a:ext>
             </a:extLst>
           </p:cNvPr>
@@ -7385,7 +6661,7 @@
           <p:cNvPr id="2" name="Title 1">
             <a:extLst>
               <a:ext uri="{FF2B5EF4-FFF2-40B4-BE49-F238E27FC236}">
-                <a16:creationId xmlns="" xmlns:a16="http://schemas.microsoft.com/office/drawing/2014/main" id="{29DEBCF3-7FBB-46B2-A35F-D7B2A1370930}"/>
+                <a16:creationId xmlns:a16="http://schemas.microsoft.com/office/drawing/2014/main" xmlns="" id="{29DEBCF3-7FBB-46B2-A35F-D7B2A1370930}"/>
               </a:ext>
             </a:extLst>
           </p:cNvPr>
@@ -7413,7 +6689,7 @@
           <p:cNvPr id="3" name="Content Placeholder 2">
             <a:extLst>
               <a:ext uri="{FF2B5EF4-FFF2-40B4-BE49-F238E27FC236}">
-                <a16:creationId xmlns="" xmlns:a16="http://schemas.microsoft.com/office/drawing/2014/main" id="{2C45739F-01DD-46CB-B63E-B647E9BA7564}"/>
+                <a16:creationId xmlns:a16="http://schemas.microsoft.com/office/drawing/2014/main" xmlns="" id="{2C45739F-01DD-46CB-B63E-B647E9BA7564}"/>
               </a:ext>
             </a:extLst>
           </p:cNvPr>
@@ -7508,7 +6784,7 @@
           <p:cNvPr id="2" name="Title 1">
             <a:extLst>
               <a:ext uri="{FF2B5EF4-FFF2-40B4-BE49-F238E27FC236}">
-                <a16:creationId xmlns="" xmlns:a16="http://schemas.microsoft.com/office/drawing/2014/main" id="{98D2FAB7-BB4F-4BCD-A901-6734C847F4F2}"/>
+                <a16:creationId xmlns:a16="http://schemas.microsoft.com/office/drawing/2014/main" xmlns="" id="{98D2FAB7-BB4F-4BCD-A901-6734C847F4F2}"/>
               </a:ext>
             </a:extLst>
           </p:cNvPr>
@@ -7536,7 +6812,7 @@
           <p:cNvPr id="3" name="Content Placeholder 2">
             <a:extLst>
               <a:ext uri="{FF2B5EF4-FFF2-40B4-BE49-F238E27FC236}">
-                <a16:creationId xmlns="" xmlns:a16="http://schemas.microsoft.com/office/drawing/2014/main" id="{7DCF5F2B-6AAA-4CE5-BD6C-380E38ED8740}"/>
+                <a16:creationId xmlns:a16="http://schemas.microsoft.com/office/drawing/2014/main" xmlns="" id="{7DCF5F2B-6AAA-4CE5-BD6C-380E38ED8740}"/>
               </a:ext>
             </a:extLst>
           </p:cNvPr>
@@ -7703,7 +6979,7 @@
           <p:cNvPr id="14338" name="Slide Number Placeholder 3">
             <a:extLst>
               <a:ext uri="{FF2B5EF4-FFF2-40B4-BE49-F238E27FC236}">
-                <a16:creationId xmlns="" xmlns:a16="http://schemas.microsoft.com/office/drawing/2014/main" id="{52650958-CBEA-4622-849A-D2CDE06030D8}"/>
+                <a16:creationId xmlns:a16="http://schemas.microsoft.com/office/drawing/2014/main" xmlns="" id="{52650958-CBEA-4622-849A-D2CDE06030D8}"/>
               </a:ext>
             </a:extLst>
           </p:cNvPr>
@@ -7869,7 +7145,7 @@
           <p:cNvPr id="14339" name="Rectangle 2">
             <a:extLst>
               <a:ext uri="{FF2B5EF4-FFF2-40B4-BE49-F238E27FC236}">
-                <a16:creationId xmlns="" xmlns:a16="http://schemas.microsoft.com/office/drawing/2014/main" id="{BF594BDB-5255-42DD-B4F8-9BFD06261E26}"/>
+                <a16:creationId xmlns:a16="http://schemas.microsoft.com/office/drawing/2014/main" xmlns="" id="{BF594BDB-5255-42DD-B4F8-9BFD06261E26}"/>
               </a:ext>
             </a:extLst>
           </p:cNvPr>
@@ -7915,7 +7191,7 @@
           <p:cNvPr id="14340" name="Picture 3">
             <a:extLst>
               <a:ext uri="{FF2B5EF4-FFF2-40B4-BE49-F238E27FC236}">
-                <a16:creationId xmlns="" xmlns:a16="http://schemas.microsoft.com/office/drawing/2014/main" id="{F90FC534-A1BE-4E31-A547-60954C9D3946}"/>
+                <a16:creationId xmlns:a16="http://schemas.microsoft.com/office/drawing/2014/main" xmlns="" id="{F90FC534-A1BE-4E31-A547-60954C9D3946}"/>
               </a:ext>
             </a:extLst>
           </p:cNvPr>
@@ -7976,7 +7252,7 @@
           <p:cNvPr id="15362" name="Slide Number Placeholder 3">
             <a:extLst>
               <a:ext uri="{FF2B5EF4-FFF2-40B4-BE49-F238E27FC236}">
-                <a16:creationId xmlns="" xmlns:a16="http://schemas.microsoft.com/office/drawing/2014/main" id="{B848ADAD-270B-45B8-A55A-63687305A60C}"/>
+                <a16:creationId xmlns:a16="http://schemas.microsoft.com/office/drawing/2014/main" xmlns="" id="{B848ADAD-270B-45B8-A55A-63687305A60C}"/>
               </a:ext>
             </a:extLst>
           </p:cNvPr>
@@ -8142,7 +7418,7 @@
           <p:cNvPr id="15363" name="Rectangle 2">
             <a:extLst>
               <a:ext uri="{FF2B5EF4-FFF2-40B4-BE49-F238E27FC236}">
-                <a16:creationId xmlns="" xmlns:a16="http://schemas.microsoft.com/office/drawing/2014/main" id="{7D0C89AD-CA37-4E19-B559-7EFD41BFD30C}"/>
+                <a16:creationId xmlns:a16="http://schemas.microsoft.com/office/drawing/2014/main" xmlns="" id="{7D0C89AD-CA37-4E19-B559-7EFD41BFD30C}"/>
               </a:ext>
             </a:extLst>
           </p:cNvPr>
@@ -8192,7 +7468,7 @@
           <p:cNvPr id="15364" name="Picture 3">
             <a:extLst>
               <a:ext uri="{FF2B5EF4-FFF2-40B4-BE49-F238E27FC236}">
-                <a16:creationId xmlns="" xmlns:a16="http://schemas.microsoft.com/office/drawing/2014/main" id="{39923134-7E75-47A9-A080-36A84D56F27B}"/>
+                <a16:creationId xmlns:a16="http://schemas.microsoft.com/office/drawing/2014/main" xmlns="" id="{39923134-7E75-47A9-A080-36A84D56F27B}"/>
               </a:ext>
             </a:extLst>
           </p:cNvPr>

</xml_diff>